<commit_message>
added more icons to the Annotation toolbar
git-svn-id: https://svn.janelia.org/penglab/projects/vaa3d_tools@1273 f26c06c5-4756-4547-a2b9-0b39063de1b8
</commit_message>
<xml_diff>
--- a/released_plugins/v3d_plugins/teramanager/icons.pptx
+++ b/released_plugins/v3d_plugins/teramanager/icons.pptx
@@ -6,6 +6,7 @@
   </p:sldMasterIdLst>
   <p:sldIdLst>
     <p:sldId id="256" r:id="rId2"/>
+    <p:sldId id="257" r:id="rId3"/>
   </p:sldIdLst>
   <p:sldSz cx="9144000" cy="6858000" type="screen4x3"/>
   <p:notesSz cx="6858000" cy="9144000"/>
@@ -288,7 +289,7 @@
           <a:p>
             <a:fld id="{A3FFFC81-E8A9-43A5-BD7A-0818E158DC6F}" type="datetimeFigureOut">
               <a:rPr lang="en-US" smtClean="0"/>
-              <a:t>4/4/2014</a:t>
+              <a:t>4/19/2014</a:t>
             </a:fld>
             <a:endParaRPr lang="en-US"/>
           </a:p>
@@ -458,7 +459,7 @@
           <a:p>
             <a:fld id="{A3FFFC81-E8A9-43A5-BD7A-0818E158DC6F}" type="datetimeFigureOut">
               <a:rPr lang="en-US" smtClean="0"/>
-              <a:t>4/4/2014</a:t>
+              <a:t>4/19/2014</a:t>
             </a:fld>
             <a:endParaRPr lang="en-US"/>
           </a:p>
@@ -638,7 +639,7 @@
           <a:p>
             <a:fld id="{A3FFFC81-E8A9-43A5-BD7A-0818E158DC6F}" type="datetimeFigureOut">
               <a:rPr lang="en-US" smtClean="0"/>
-              <a:t>4/4/2014</a:t>
+              <a:t>4/19/2014</a:t>
             </a:fld>
             <a:endParaRPr lang="en-US"/>
           </a:p>
@@ -808,7 +809,7 @@
           <a:p>
             <a:fld id="{A3FFFC81-E8A9-43A5-BD7A-0818E158DC6F}" type="datetimeFigureOut">
               <a:rPr lang="en-US" smtClean="0"/>
-              <a:t>4/4/2014</a:t>
+              <a:t>4/19/2014</a:t>
             </a:fld>
             <a:endParaRPr lang="en-US"/>
           </a:p>
@@ -1054,7 +1055,7 @@
           <a:p>
             <a:fld id="{A3FFFC81-E8A9-43A5-BD7A-0818E158DC6F}" type="datetimeFigureOut">
               <a:rPr lang="en-US" smtClean="0"/>
-              <a:t>4/4/2014</a:t>
+              <a:t>4/19/2014</a:t>
             </a:fld>
             <a:endParaRPr lang="en-US"/>
           </a:p>
@@ -1342,7 +1343,7 @@
           <a:p>
             <a:fld id="{A3FFFC81-E8A9-43A5-BD7A-0818E158DC6F}" type="datetimeFigureOut">
               <a:rPr lang="en-US" smtClean="0"/>
-              <a:t>4/4/2014</a:t>
+              <a:t>4/19/2014</a:t>
             </a:fld>
             <a:endParaRPr lang="en-US"/>
           </a:p>
@@ -1764,7 +1765,7 @@
           <a:p>
             <a:fld id="{A3FFFC81-E8A9-43A5-BD7A-0818E158DC6F}" type="datetimeFigureOut">
               <a:rPr lang="en-US" smtClean="0"/>
-              <a:t>4/4/2014</a:t>
+              <a:t>4/19/2014</a:t>
             </a:fld>
             <a:endParaRPr lang="en-US"/>
           </a:p>
@@ -1882,7 +1883,7 @@
           <a:p>
             <a:fld id="{A3FFFC81-E8A9-43A5-BD7A-0818E158DC6F}" type="datetimeFigureOut">
               <a:rPr lang="en-US" smtClean="0"/>
-              <a:t>4/4/2014</a:t>
+              <a:t>4/19/2014</a:t>
             </a:fld>
             <a:endParaRPr lang="en-US"/>
           </a:p>
@@ -1977,7 +1978,7 @@
           <a:p>
             <a:fld id="{A3FFFC81-E8A9-43A5-BD7A-0818E158DC6F}" type="datetimeFigureOut">
               <a:rPr lang="en-US" smtClean="0"/>
-              <a:t>4/4/2014</a:t>
+              <a:t>4/19/2014</a:t>
             </a:fld>
             <a:endParaRPr lang="en-US"/>
           </a:p>
@@ -2254,7 +2255,7 @@
           <a:p>
             <a:fld id="{A3FFFC81-E8A9-43A5-BD7A-0818E158DC6F}" type="datetimeFigureOut">
               <a:rPr lang="en-US" smtClean="0"/>
-              <a:t>4/4/2014</a:t>
+              <a:t>4/19/2014</a:t>
             </a:fld>
             <a:endParaRPr lang="en-US"/>
           </a:p>
@@ -2507,7 +2508,7 @@
           <a:p>
             <a:fld id="{A3FFFC81-E8A9-43A5-BD7A-0818E158DC6F}" type="datetimeFigureOut">
               <a:rPr lang="en-US" smtClean="0"/>
-              <a:t>4/4/2014</a:t>
+              <a:t>4/19/2014</a:t>
             </a:fld>
             <a:endParaRPr lang="en-US"/>
           </a:p>
@@ -2720,7 +2721,7 @@
           <a:p>
             <a:fld id="{A3FFFC81-E8A9-43A5-BD7A-0818E158DC6F}" type="datetimeFigureOut">
               <a:rPr lang="en-US" smtClean="0"/>
-              <a:t>4/4/2014</a:t>
+              <a:t>4/19/2014</a:t>
             </a:fld>
             <a:endParaRPr lang="en-US"/>
           </a:p>
@@ -3104,7 +3105,7 @@
         <p:spPr>
           <a:xfrm>
             <a:off x="6057900" y="253820"/>
-            <a:ext cx="1445443" cy="5682160"/>
+            <a:ext cx="1445443" cy="6375580"/>
           </a:xfrm>
           <a:prstGeom prst="roundRect">
             <a:avLst>
@@ -3638,7 +3639,7 @@
         <p:spPr>
           <a:xfrm flipV="1">
             <a:off x="6705694" y="299540"/>
-            <a:ext cx="0" cy="4230480"/>
+            <a:ext cx="0" cy="6192700"/>
           </a:xfrm>
           <a:prstGeom prst="line">
             <a:avLst/>
@@ -3661,7 +3662,7 @@
       </p:cxnSp>
       <p:grpSp>
         <p:nvGrpSpPr>
-          <p:cNvPr id="28" name="Gruppo 27"/>
+          <p:cNvPr id="15" name="Gruppo 14"/>
           <p:cNvGrpSpPr/>
           <p:nvPr/>
         </p:nvGrpSpPr>
@@ -3675,533 +3676,18 @@
         </p:grpSpPr>
         <p:sp>
           <p:nvSpPr>
-            <p:cNvPr id="21" name="Figura a mano libera 20"/>
+            <p:cNvPr id="21" name="Ovale 20"/>
             <p:cNvSpPr/>
             <p:nvPr/>
           </p:nvSpPr>
           <p:spPr>
-            <a:xfrm flipH="1">
-              <a:off x="6246176" y="3210704"/>
-              <a:ext cx="1080000" cy="1079356"/>
+            <a:xfrm rot="19142320" flipH="1">
+              <a:off x="6176914" y="3314797"/>
+              <a:ext cx="1224000" cy="856373"/>
             </a:xfrm>
-            <a:custGeom>
+            <a:prstGeom prst="ellipse">
               <a:avLst/>
-              <a:gdLst>
-                <a:gd name="connsiteX0" fmla="*/ 609600 w 825005"/>
-                <a:gd name="connsiteY0" fmla="*/ 22860 h 845820"/>
-                <a:gd name="connsiteX1" fmla="*/ 609600 w 825005"/>
-                <a:gd name="connsiteY1" fmla="*/ 22860 h 845820"/>
-                <a:gd name="connsiteX2" fmla="*/ 541020 w 825005"/>
-                <a:gd name="connsiteY2" fmla="*/ 106680 h 845820"/>
-                <a:gd name="connsiteX3" fmla="*/ 518160 w 825005"/>
-                <a:gd name="connsiteY3" fmla="*/ 114300 h 845820"/>
-                <a:gd name="connsiteX4" fmla="*/ 495300 w 825005"/>
-                <a:gd name="connsiteY4" fmla="*/ 129540 h 845820"/>
-                <a:gd name="connsiteX5" fmla="*/ 472440 w 825005"/>
-                <a:gd name="connsiteY5" fmla="*/ 137160 h 845820"/>
-                <a:gd name="connsiteX6" fmla="*/ 396240 w 825005"/>
-                <a:gd name="connsiteY6" fmla="*/ 182880 h 845820"/>
-                <a:gd name="connsiteX7" fmla="*/ 365760 w 825005"/>
-                <a:gd name="connsiteY7" fmla="*/ 198120 h 845820"/>
-                <a:gd name="connsiteX8" fmla="*/ 274320 w 825005"/>
-                <a:gd name="connsiteY8" fmla="*/ 205740 h 845820"/>
-                <a:gd name="connsiteX9" fmla="*/ 220980 w 825005"/>
-                <a:gd name="connsiteY9" fmla="*/ 220980 h 845820"/>
-                <a:gd name="connsiteX10" fmla="*/ 182880 w 825005"/>
-                <a:gd name="connsiteY10" fmla="*/ 228600 h 845820"/>
-                <a:gd name="connsiteX11" fmla="*/ 160020 w 825005"/>
-                <a:gd name="connsiteY11" fmla="*/ 243840 h 845820"/>
-                <a:gd name="connsiteX12" fmla="*/ 129540 w 825005"/>
-                <a:gd name="connsiteY12" fmla="*/ 251460 h 845820"/>
-                <a:gd name="connsiteX13" fmla="*/ 68580 w 825005"/>
-                <a:gd name="connsiteY13" fmla="*/ 289560 h 845820"/>
-                <a:gd name="connsiteX14" fmla="*/ 7620 w 825005"/>
-                <a:gd name="connsiteY14" fmla="*/ 358140 h 845820"/>
-                <a:gd name="connsiteX15" fmla="*/ 0 w 825005"/>
-                <a:gd name="connsiteY15" fmla="*/ 381000 h 845820"/>
-                <a:gd name="connsiteX16" fmla="*/ 15240 w 825005"/>
-                <a:gd name="connsiteY16" fmla="*/ 586740 h 845820"/>
-                <a:gd name="connsiteX17" fmla="*/ 38100 w 825005"/>
-                <a:gd name="connsiteY17" fmla="*/ 617220 h 845820"/>
-                <a:gd name="connsiteX18" fmla="*/ 45720 w 825005"/>
-                <a:gd name="connsiteY18" fmla="*/ 640080 h 845820"/>
-                <a:gd name="connsiteX19" fmla="*/ 60960 w 825005"/>
-                <a:gd name="connsiteY19" fmla="*/ 662940 h 845820"/>
-                <a:gd name="connsiteX20" fmla="*/ 83820 w 825005"/>
-                <a:gd name="connsiteY20" fmla="*/ 701040 h 845820"/>
-                <a:gd name="connsiteX21" fmla="*/ 91440 w 825005"/>
-                <a:gd name="connsiteY21" fmla="*/ 723900 h 845820"/>
-                <a:gd name="connsiteX22" fmla="*/ 114300 w 825005"/>
-                <a:gd name="connsiteY22" fmla="*/ 739140 h 845820"/>
-                <a:gd name="connsiteX23" fmla="*/ 175260 w 825005"/>
-                <a:gd name="connsiteY23" fmla="*/ 807720 h 845820"/>
-                <a:gd name="connsiteX24" fmla="*/ 205740 w 825005"/>
-                <a:gd name="connsiteY24" fmla="*/ 822960 h 845820"/>
-                <a:gd name="connsiteX25" fmla="*/ 342900 w 825005"/>
-                <a:gd name="connsiteY25" fmla="*/ 845820 h 845820"/>
-                <a:gd name="connsiteX26" fmla="*/ 556260 w 825005"/>
-                <a:gd name="connsiteY26" fmla="*/ 838200 h 845820"/>
-                <a:gd name="connsiteX27" fmla="*/ 617220 w 825005"/>
-                <a:gd name="connsiteY27" fmla="*/ 830580 h 845820"/>
-                <a:gd name="connsiteX28" fmla="*/ 640080 w 825005"/>
-                <a:gd name="connsiteY28" fmla="*/ 815340 h 845820"/>
-                <a:gd name="connsiteX29" fmla="*/ 678180 w 825005"/>
-                <a:gd name="connsiteY29" fmla="*/ 807720 h 845820"/>
-                <a:gd name="connsiteX30" fmla="*/ 701040 w 825005"/>
-                <a:gd name="connsiteY30" fmla="*/ 792480 h 845820"/>
-                <a:gd name="connsiteX31" fmla="*/ 723900 w 825005"/>
-                <a:gd name="connsiteY31" fmla="*/ 784860 h 845820"/>
-                <a:gd name="connsiteX32" fmla="*/ 746760 w 825005"/>
-                <a:gd name="connsiteY32" fmla="*/ 762000 h 845820"/>
-                <a:gd name="connsiteX33" fmla="*/ 800100 w 825005"/>
-                <a:gd name="connsiteY33" fmla="*/ 716280 h 845820"/>
-                <a:gd name="connsiteX34" fmla="*/ 807720 w 825005"/>
-                <a:gd name="connsiteY34" fmla="*/ 685800 h 845820"/>
-                <a:gd name="connsiteX35" fmla="*/ 822960 w 825005"/>
-                <a:gd name="connsiteY35" fmla="*/ 662940 h 845820"/>
-                <a:gd name="connsiteX36" fmla="*/ 807720 w 825005"/>
-                <a:gd name="connsiteY36" fmla="*/ 525780 h 845820"/>
-                <a:gd name="connsiteX37" fmla="*/ 792480 w 825005"/>
-                <a:gd name="connsiteY37" fmla="*/ 502920 h 845820"/>
-                <a:gd name="connsiteX38" fmla="*/ 784860 w 825005"/>
-                <a:gd name="connsiteY38" fmla="*/ 480060 h 845820"/>
-                <a:gd name="connsiteX39" fmla="*/ 769620 w 825005"/>
-                <a:gd name="connsiteY39" fmla="*/ 419100 h 845820"/>
-                <a:gd name="connsiteX40" fmla="*/ 784860 w 825005"/>
-                <a:gd name="connsiteY40" fmla="*/ 289560 h 845820"/>
-                <a:gd name="connsiteX41" fmla="*/ 800100 w 825005"/>
-                <a:gd name="connsiteY41" fmla="*/ 266700 h 845820"/>
-                <a:gd name="connsiteX42" fmla="*/ 807720 w 825005"/>
-                <a:gd name="connsiteY42" fmla="*/ 236220 h 845820"/>
-                <a:gd name="connsiteX43" fmla="*/ 822960 w 825005"/>
-                <a:gd name="connsiteY43" fmla="*/ 213360 h 845820"/>
-                <a:gd name="connsiteX44" fmla="*/ 815340 w 825005"/>
-                <a:gd name="connsiteY44" fmla="*/ 68580 h 845820"/>
-                <a:gd name="connsiteX45" fmla="*/ 807720 w 825005"/>
-                <a:gd name="connsiteY45" fmla="*/ 45720 h 845820"/>
-                <a:gd name="connsiteX46" fmla="*/ 784860 w 825005"/>
-                <a:gd name="connsiteY46" fmla="*/ 22860 h 845820"/>
-                <a:gd name="connsiteX47" fmla="*/ 762000 w 825005"/>
-                <a:gd name="connsiteY47" fmla="*/ 15240 h 845820"/>
-                <a:gd name="connsiteX48" fmla="*/ 723900 w 825005"/>
-                <a:gd name="connsiteY48" fmla="*/ 0 h 845820"/>
-                <a:gd name="connsiteX49" fmla="*/ 662940 w 825005"/>
-                <a:gd name="connsiteY49" fmla="*/ 7620 h 845820"/>
-                <a:gd name="connsiteX50" fmla="*/ 609600 w 825005"/>
-                <a:gd name="connsiteY50" fmla="*/ 22860 h 845820"/>
-              </a:gdLst>
-              <a:ahLst/>
-              <a:cxnLst>
-                <a:cxn ang="0">
-                  <a:pos x="connsiteX0" y="connsiteY0"/>
-                </a:cxn>
-                <a:cxn ang="0">
-                  <a:pos x="connsiteX1" y="connsiteY1"/>
-                </a:cxn>
-                <a:cxn ang="0">
-                  <a:pos x="connsiteX2" y="connsiteY2"/>
-                </a:cxn>
-                <a:cxn ang="0">
-                  <a:pos x="connsiteX3" y="connsiteY3"/>
-                </a:cxn>
-                <a:cxn ang="0">
-                  <a:pos x="connsiteX4" y="connsiteY4"/>
-                </a:cxn>
-                <a:cxn ang="0">
-                  <a:pos x="connsiteX5" y="connsiteY5"/>
-                </a:cxn>
-                <a:cxn ang="0">
-                  <a:pos x="connsiteX6" y="connsiteY6"/>
-                </a:cxn>
-                <a:cxn ang="0">
-                  <a:pos x="connsiteX7" y="connsiteY7"/>
-                </a:cxn>
-                <a:cxn ang="0">
-                  <a:pos x="connsiteX8" y="connsiteY8"/>
-                </a:cxn>
-                <a:cxn ang="0">
-                  <a:pos x="connsiteX9" y="connsiteY9"/>
-                </a:cxn>
-                <a:cxn ang="0">
-                  <a:pos x="connsiteX10" y="connsiteY10"/>
-                </a:cxn>
-                <a:cxn ang="0">
-                  <a:pos x="connsiteX11" y="connsiteY11"/>
-                </a:cxn>
-                <a:cxn ang="0">
-                  <a:pos x="connsiteX12" y="connsiteY12"/>
-                </a:cxn>
-                <a:cxn ang="0">
-                  <a:pos x="connsiteX13" y="connsiteY13"/>
-                </a:cxn>
-                <a:cxn ang="0">
-                  <a:pos x="connsiteX14" y="connsiteY14"/>
-                </a:cxn>
-                <a:cxn ang="0">
-                  <a:pos x="connsiteX15" y="connsiteY15"/>
-                </a:cxn>
-                <a:cxn ang="0">
-                  <a:pos x="connsiteX16" y="connsiteY16"/>
-                </a:cxn>
-                <a:cxn ang="0">
-                  <a:pos x="connsiteX17" y="connsiteY17"/>
-                </a:cxn>
-                <a:cxn ang="0">
-                  <a:pos x="connsiteX18" y="connsiteY18"/>
-                </a:cxn>
-                <a:cxn ang="0">
-                  <a:pos x="connsiteX19" y="connsiteY19"/>
-                </a:cxn>
-                <a:cxn ang="0">
-                  <a:pos x="connsiteX20" y="connsiteY20"/>
-                </a:cxn>
-                <a:cxn ang="0">
-                  <a:pos x="connsiteX21" y="connsiteY21"/>
-                </a:cxn>
-                <a:cxn ang="0">
-                  <a:pos x="connsiteX22" y="connsiteY22"/>
-                </a:cxn>
-                <a:cxn ang="0">
-                  <a:pos x="connsiteX23" y="connsiteY23"/>
-                </a:cxn>
-                <a:cxn ang="0">
-                  <a:pos x="connsiteX24" y="connsiteY24"/>
-                </a:cxn>
-                <a:cxn ang="0">
-                  <a:pos x="connsiteX25" y="connsiteY25"/>
-                </a:cxn>
-                <a:cxn ang="0">
-                  <a:pos x="connsiteX26" y="connsiteY26"/>
-                </a:cxn>
-                <a:cxn ang="0">
-                  <a:pos x="connsiteX27" y="connsiteY27"/>
-                </a:cxn>
-                <a:cxn ang="0">
-                  <a:pos x="connsiteX28" y="connsiteY28"/>
-                </a:cxn>
-                <a:cxn ang="0">
-                  <a:pos x="connsiteX29" y="connsiteY29"/>
-                </a:cxn>
-                <a:cxn ang="0">
-                  <a:pos x="connsiteX30" y="connsiteY30"/>
-                </a:cxn>
-                <a:cxn ang="0">
-                  <a:pos x="connsiteX31" y="connsiteY31"/>
-                </a:cxn>
-                <a:cxn ang="0">
-                  <a:pos x="connsiteX32" y="connsiteY32"/>
-                </a:cxn>
-                <a:cxn ang="0">
-                  <a:pos x="connsiteX33" y="connsiteY33"/>
-                </a:cxn>
-                <a:cxn ang="0">
-                  <a:pos x="connsiteX34" y="connsiteY34"/>
-                </a:cxn>
-                <a:cxn ang="0">
-                  <a:pos x="connsiteX35" y="connsiteY35"/>
-                </a:cxn>
-                <a:cxn ang="0">
-                  <a:pos x="connsiteX36" y="connsiteY36"/>
-                </a:cxn>
-                <a:cxn ang="0">
-                  <a:pos x="connsiteX37" y="connsiteY37"/>
-                </a:cxn>
-                <a:cxn ang="0">
-                  <a:pos x="connsiteX38" y="connsiteY38"/>
-                </a:cxn>
-                <a:cxn ang="0">
-                  <a:pos x="connsiteX39" y="connsiteY39"/>
-                </a:cxn>
-                <a:cxn ang="0">
-                  <a:pos x="connsiteX40" y="connsiteY40"/>
-                </a:cxn>
-                <a:cxn ang="0">
-                  <a:pos x="connsiteX41" y="connsiteY41"/>
-                </a:cxn>
-                <a:cxn ang="0">
-                  <a:pos x="connsiteX42" y="connsiteY42"/>
-                </a:cxn>
-                <a:cxn ang="0">
-                  <a:pos x="connsiteX43" y="connsiteY43"/>
-                </a:cxn>
-                <a:cxn ang="0">
-                  <a:pos x="connsiteX44" y="connsiteY44"/>
-                </a:cxn>
-                <a:cxn ang="0">
-                  <a:pos x="connsiteX45" y="connsiteY45"/>
-                </a:cxn>
-                <a:cxn ang="0">
-                  <a:pos x="connsiteX46" y="connsiteY46"/>
-                </a:cxn>
-                <a:cxn ang="0">
-                  <a:pos x="connsiteX47" y="connsiteY47"/>
-                </a:cxn>
-                <a:cxn ang="0">
-                  <a:pos x="connsiteX48" y="connsiteY48"/>
-                </a:cxn>
-                <a:cxn ang="0">
-                  <a:pos x="connsiteX49" y="connsiteY49"/>
-                </a:cxn>
-                <a:cxn ang="0">
-                  <a:pos x="connsiteX50" y="connsiteY50"/>
-                </a:cxn>
-              </a:cxnLst>
-              <a:rect l="l" t="t" r="r" b="b"/>
-              <a:pathLst>
-                <a:path w="825005" h="845820">
-                  <a:moveTo>
-                    <a:pt x="609600" y="22860"/>
-                  </a:moveTo>
-                  <a:lnTo>
-                    <a:pt x="609600" y="22860"/>
-                  </a:lnTo>
-                  <a:cubicBezTo>
-                    <a:pt x="605522" y="28298"/>
-                    <a:pt x="561430" y="93073"/>
-                    <a:pt x="541020" y="106680"/>
-                  </a:cubicBezTo>
-                  <a:cubicBezTo>
-                    <a:pt x="534337" y="111135"/>
-                    <a:pt x="525344" y="110708"/>
-                    <a:pt x="518160" y="114300"/>
-                  </a:cubicBezTo>
-                  <a:cubicBezTo>
-                    <a:pt x="509969" y="118396"/>
-                    <a:pt x="503491" y="125444"/>
-                    <a:pt x="495300" y="129540"/>
-                  </a:cubicBezTo>
-                  <a:cubicBezTo>
-                    <a:pt x="488116" y="133132"/>
-                    <a:pt x="479512" y="133352"/>
-                    <a:pt x="472440" y="137160"/>
-                  </a:cubicBezTo>
-                  <a:cubicBezTo>
-                    <a:pt x="446359" y="151203"/>
-                    <a:pt x="422734" y="169633"/>
-                    <a:pt x="396240" y="182880"/>
-                  </a:cubicBezTo>
-                  <a:cubicBezTo>
-                    <a:pt x="386080" y="187960"/>
-                    <a:pt x="376925" y="196027"/>
-                    <a:pt x="365760" y="198120"/>
-                  </a:cubicBezTo>
-                  <a:cubicBezTo>
-                    <a:pt x="335698" y="203757"/>
-                    <a:pt x="304800" y="203200"/>
-                    <a:pt x="274320" y="205740"/>
-                  </a:cubicBezTo>
-                  <a:cubicBezTo>
-                    <a:pt x="256540" y="210820"/>
-                    <a:pt x="238919" y="216495"/>
-                    <a:pt x="220980" y="220980"/>
-                  </a:cubicBezTo>
-                  <a:cubicBezTo>
-                    <a:pt x="208415" y="224121"/>
-                    <a:pt x="195007" y="224052"/>
-                    <a:pt x="182880" y="228600"/>
-                  </a:cubicBezTo>
-                  <a:cubicBezTo>
-                    <a:pt x="174305" y="231816"/>
-                    <a:pt x="168438" y="240232"/>
-                    <a:pt x="160020" y="243840"/>
-                  </a:cubicBezTo>
-                  <a:cubicBezTo>
-                    <a:pt x="150394" y="247965"/>
-                    <a:pt x="139346" y="247783"/>
-                    <a:pt x="129540" y="251460"/>
-                  </a:cubicBezTo>
-                  <a:cubicBezTo>
-                    <a:pt x="107774" y="259622"/>
-                    <a:pt x="85705" y="274148"/>
-                    <a:pt x="68580" y="289560"/>
-                  </a:cubicBezTo>
-                  <a:cubicBezTo>
-                    <a:pt x="50221" y="306083"/>
-                    <a:pt x="20438" y="332505"/>
-                    <a:pt x="7620" y="358140"/>
-                  </a:cubicBezTo>
-                  <a:cubicBezTo>
-                    <a:pt x="4028" y="365324"/>
-                    <a:pt x="2540" y="373380"/>
-                    <a:pt x="0" y="381000"/>
-                  </a:cubicBezTo>
-                  <a:cubicBezTo>
-                    <a:pt x="5080" y="449580"/>
-                    <a:pt x="4290" y="518850"/>
-                    <a:pt x="15240" y="586740"/>
-                  </a:cubicBezTo>
-                  <a:cubicBezTo>
-                    <a:pt x="17262" y="599278"/>
-                    <a:pt x="31799" y="606193"/>
-                    <a:pt x="38100" y="617220"/>
-                  </a:cubicBezTo>
-                  <a:cubicBezTo>
-                    <a:pt x="42085" y="624194"/>
-                    <a:pt x="42128" y="632896"/>
-                    <a:pt x="45720" y="640080"/>
-                  </a:cubicBezTo>
-                  <a:cubicBezTo>
-                    <a:pt x="49816" y="648271"/>
-                    <a:pt x="56106" y="655174"/>
-                    <a:pt x="60960" y="662940"/>
-                  </a:cubicBezTo>
-                  <a:cubicBezTo>
-                    <a:pt x="68810" y="675499"/>
-                    <a:pt x="77196" y="687793"/>
-                    <a:pt x="83820" y="701040"/>
-                  </a:cubicBezTo>
-                  <a:cubicBezTo>
-                    <a:pt x="87412" y="708224"/>
-                    <a:pt x="86422" y="717628"/>
-                    <a:pt x="91440" y="723900"/>
-                  </a:cubicBezTo>
-                  <a:cubicBezTo>
-                    <a:pt x="97161" y="731051"/>
-                    <a:pt x="106680" y="734060"/>
-                    <a:pt x="114300" y="739140"/>
-                  </a:cubicBezTo>
-                  <a:cubicBezTo>
-                    <a:pt x="130406" y="763299"/>
-                    <a:pt x="149162" y="794671"/>
-                    <a:pt x="175260" y="807720"/>
-                  </a:cubicBezTo>
-                  <a:cubicBezTo>
-                    <a:pt x="185420" y="812800"/>
-                    <a:pt x="194663" y="820443"/>
-                    <a:pt x="205740" y="822960"/>
-                  </a:cubicBezTo>
-                  <a:cubicBezTo>
-                    <a:pt x="250938" y="833232"/>
-                    <a:pt x="342900" y="845820"/>
-                    <a:pt x="342900" y="845820"/>
-                  </a:cubicBezTo>
-                  <a:lnTo>
-                    <a:pt x="556260" y="838200"/>
-                  </a:lnTo>
-                  <a:cubicBezTo>
-                    <a:pt x="576707" y="837064"/>
-                    <a:pt x="597463" y="835968"/>
-                    <a:pt x="617220" y="830580"/>
-                  </a:cubicBezTo>
-                  <a:cubicBezTo>
-                    <a:pt x="626055" y="828170"/>
-                    <a:pt x="631505" y="818556"/>
-                    <a:pt x="640080" y="815340"/>
-                  </a:cubicBezTo>
-                  <a:cubicBezTo>
-                    <a:pt x="652207" y="810792"/>
-                    <a:pt x="665480" y="810260"/>
-                    <a:pt x="678180" y="807720"/>
-                  </a:cubicBezTo>
-                  <a:cubicBezTo>
-                    <a:pt x="685800" y="802640"/>
-                    <a:pt x="692849" y="796576"/>
-                    <a:pt x="701040" y="792480"/>
-                  </a:cubicBezTo>
-                  <a:cubicBezTo>
-                    <a:pt x="708224" y="788888"/>
-                    <a:pt x="717217" y="789315"/>
-                    <a:pt x="723900" y="784860"/>
-                  </a:cubicBezTo>
-                  <a:cubicBezTo>
-                    <a:pt x="732866" y="778882"/>
-                    <a:pt x="738578" y="769013"/>
-                    <a:pt x="746760" y="762000"/>
-                  </a:cubicBezTo>
-                  <a:cubicBezTo>
-                    <a:pt x="815187" y="703348"/>
-                    <a:pt x="743376" y="773004"/>
-                    <a:pt x="800100" y="716280"/>
-                  </a:cubicBezTo>
-                  <a:cubicBezTo>
-                    <a:pt x="802640" y="706120"/>
-                    <a:pt x="803595" y="695426"/>
-                    <a:pt x="807720" y="685800"/>
-                  </a:cubicBezTo>
-                  <a:cubicBezTo>
-                    <a:pt x="811328" y="677382"/>
-                    <a:pt x="822960" y="672098"/>
-                    <a:pt x="822960" y="662940"/>
-                  </a:cubicBezTo>
-                  <a:cubicBezTo>
-                    <a:pt x="822960" y="616939"/>
-                    <a:pt x="833237" y="564055"/>
-                    <a:pt x="807720" y="525780"/>
-                  </a:cubicBezTo>
-                  <a:cubicBezTo>
-                    <a:pt x="802640" y="518160"/>
-                    <a:pt x="796576" y="511111"/>
-                    <a:pt x="792480" y="502920"/>
-                  </a:cubicBezTo>
-                  <a:cubicBezTo>
-                    <a:pt x="788888" y="495736"/>
-                    <a:pt x="786973" y="487809"/>
-                    <a:pt x="784860" y="480060"/>
-                  </a:cubicBezTo>
-                  <a:cubicBezTo>
-                    <a:pt x="779349" y="459853"/>
-                    <a:pt x="774700" y="439420"/>
-                    <a:pt x="769620" y="419100"/>
-                  </a:cubicBezTo>
-                  <a:cubicBezTo>
-                    <a:pt x="770309" y="410138"/>
-                    <a:pt x="771653" y="320375"/>
-                    <a:pt x="784860" y="289560"/>
-                  </a:cubicBezTo>
-                  <a:cubicBezTo>
-                    <a:pt x="788468" y="281142"/>
-                    <a:pt x="795020" y="274320"/>
-                    <a:pt x="800100" y="266700"/>
-                  </a:cubicBezTo>
-                  <a:cubicBezTo>
-                    <a:pt x="802640" y="256540"/>
-                    <a:pt x="803595" y="245846"/>
-                    <a:pt x="807720" y="236220"/>
-                  </a:cubicBezTo>
-                  <a:cubicBezTo>
-                    <a:pt x="811328" y="227802"/>
-                    <a:pt x="822544" y="222509"/>
-                    <a:pt x="822960" y="213360"/>
-                  </a:cubicBezTo>
-                  <a:cubicBezTo>
-                    <a:pt x="825154" y="165083"/>
-                    <a:pt x="819715" y="116708"/>
-                    <a:pt x="815340" y="68580"/>
-                  </a:cubicBezTo>
-                  <a:cubicBezTo>
-                    <a:pt x="814613" y="60581"/>
-                    <a:pt x="812175" y="52403"/>
-                    <a:pt x="807720" y="45720"/>
-                  </a:cubicBezTo>
-                  <a:cubicBezTo>
-                    <a:pt x="801742" y="36754"/>
-                    <a:pt x="793826" y="28838"/>
-                    <a:pt x="784860" y="22860"/>
-                  </a:cubicBezTo>
-                  <a:cubicBezTo>
-                    <a:pt x="778177" y="18405"/>
-                    <a:pt x="769521" y="18060"/>
-                    <a:pt x="762000" y="15240"/>
-                  </a:cubicBezTo>
-                  <a:cubicBezTo>
-                    <a:pt x="749193" y="10437"/>
-                    <a:pt x="736600" y="5080"/>
-                    <a:pt x="723900" y="0"/>
-                  </a:cubicBezTo>
-                  <a:cubicBezTo>
-                    <a:pt x="703580" y="2540"/>
-                    <a:pt x="681256" y="-1538"/>
-                    <a:pt x="662940" y="7620"/>
-                  </a:cubicBezTo>
-                  <a:cubicBezTo>
-                    <a:pt x="643663" y="17259"/>
-                    <a:pt x="618490" y="20320"/>
-                    <a:pt x="609600" y="22860"/>
-                  </a:cubicBezTo>
-                  <a:close/>
-                </a:path>
-              </a:pathLst>
-            </a:custGeom>
+            </a:prstGeom>
             <a:solidFill>
               <a:schemeClr val="bg1">
                 <a:alpha val="37000"/>
@@ -4302,7 +3788,7 @@
           </p:blipFill>
           <p:spPr>
             <a:xfrm>
-              <a:off x="6392160" y="3381833"/>
+              <a:off x="6728854" y="3374213"/>
               <a:ext cx="216000" cy="216000"/>
             </a:xfrm>
             <a:prstGeom prst="rect">
@@ -4332,7 +3818,7 @@
           </p:blipFill>
           <p:spPr>
             <a:xfrm>
-              <a:off x="6354154" y="3929528"/>
+              <a:off x="6336023" y="3813996"/>
               <a:ext cx="216000" cy="216000"/>
             </a:xfrm>
             <a:prstGeom prst="rect">
@@ -4362,7 +3848,7 @@
           </p:blipFill>
           <p:spPr>
             <a:xfrm>
-              <a:off x="6434295" y="3665010"/>
+              <a:off x="6458869" y="3557010"/>
               <a:ext cx="216000" cy="216000"/>
             </a:xfrm>
             <a:prstGeom prst="rect">
@@ -4412,10 +3898,1241 @@
           </p:spPr>
         </p:pic>
       </p:grpSp>
+      <p:cxnSp>
+        <p:nvCxnSpPr>
+          <p:cNvPr id="22" name="Connettore 1 21"/>
+          <p:cNvCxnSpPr/>
+          <p:nvPr/>
+        </p:nvCxnSpPr>
+        <p:spPr>
+          <a:xfrm flipV="1">
+            <a:off x="6246176" y="332656"/>
+            <a:ext cx="0" cy="4230480"/>
+          </a:xfrm>
+          <a:prstGeom prst="line">
+            <a:avLst/>
+          </a:prstGeom>
+        </p:spPr>
+        <p:style>
+          <a:lnRef idx="1">
+            <a:schemeClr val="accent1"/>
+          </a:lnRef>
+          <a:fillRef idx="0">
+            <a:schemeClr val="accent1"/>
+          </a:fillRef>
+          <a:effectRef idx="0">
+            <a:schemeClr val="accent1"/>
+          </a:effectRef>
+          <a:fontRef idx="minor">
+            <a:schemeClr val="tx1"/>
+          </a:fontRef>
+        </p:style>
+      </p:cxnSp>
+      <p:cxnSp>
+        <p:nvCxnSpPr>
+          <p:cNvPr id="24" name="Connettore 1 23"/>
+          <p:cNvCxnSpPr/>
+          <p:nvPr/>
+        </p:nvCxnSpPr>
+        <p:spPr>
+          <a:xfrm flipV="1">
+            <a:off x="7326176" y="422656"/>
+            <a:ext cx="0" cy="6069584"/>
+          </a:xfrm>
+          <a:prstGeom prst="line">
+            <a:avLst/>
+          </a:prstGeom>
+        </p:spPr>
+        <p:style>
+          <a:lnRef idx="1">
+            <a:schemeClr val="accent1"/>
+          </a:lnRef>
+          <a:fillRef idx="0">
+            <a:schemeClr val="accent1"/>
+          </a:fillRef>
+          <a:effectRef idx="0">
+            <a:schemeClr val="accent1"/>
+          </a:effectRef>
+          <a:fontRef idx="minor">
+            <a:schemeClr val="tx1"/>
+          </a:fontRef>
+        </p:style>
+      </p:cxnSp>
+      <p:pic>
+        <p:nvPicPr>
+          <p:cNvPr id="39" name="Immagine 38"/>
+          <p:cNvPicPr>
+            <a:picLocks noChangeAspect="1"/>
+          </p:cNvPicPr>
+          <p:nvPr/>
+        </p:nvPicPr>
+        <p:blipFill>
+          <a:blip r:embed="rId5" cstate="print">
+            <a:extLst>
+              <a:ext uri="{28A0092B-C50C-407E-A947-70E740481C1C}">
+                <a14:useLocalDpi xmlns:a14="http://schemas.microsoft.com/office/drawing/2010/main" val="0"/>
+              </a:ext>
+            </a:extLst>
+          </a:blip>
+          <a:stretch>
+            <a:fillRect/>
+          </a:stretch>
+        </p:blipFill>
+        <p:spPr>
+          <a:xfrm>
+            <a:off x="5347016" y="5171636"/>
+            <a:ext cx="144000" cy="144000"/>
+          </a:xfrm>
+          <a:prstGeom prst="rect">
+            <a:avLst/>
+          </a:prstGeom>
+        </p:spPr>
+      </p:pic>
+      <p:grpSp>
+        <p:nvGrpSpPr>
+          <p:cNvPr id="14" name="Gruppo 13"/>
+          <p:cNvGrpSpPr/>
+          <p:nvPr/>
+        </p:nvGrpSpPr>
+        <p:grpSpPr>
+          <a:xfrm>
+            <a:off x="3976296" y="4602118"/>
+            <a:ext cx="917400" cy="917020"/>
+            <a:chOff x="3290456" y="4466926"/>
+            <a:chExt cx="917400" cy="917020"/>
+          </a:xfrm>
+        </p:grpSpPr>
+        <p:sp>
+          <p:nvSpPr>
+            <p:cNvPr id="43" name="Rettangolo 42"/>
+            <p:cNvSpPr/>
+            <p:nvPr/>
+          </p:nvSpPr>
+          <p:spPr>
+            <a:xfrm>
+              <a:off x="3291056" y="4467526"/>
+              <a:ext cx="306000" cy="306000"/>
+            </a:xfrm>
+            <a:prstGeom prst="rect">
+              <a:avLst/>
+            </a:prstGeom>
+            <a:solidFill>
+              <a:srgbClr val="191940">
+                <a:alpha val="0"/>
+              </a:srgbClr>
+            </a:solidFill>
+            <a:ln w="3175"/>
+          </p:spPr>
+          <p:style>
+            <a:lnRef idx="2">
+              <a:schemeClr val="accent1">
+                <a:shade val="50000"/>
+              </a:schemeClr>
+            </a:lnRef>
+            <a:fillRef idx="1">
+              <a:schemeClr val="accent1"/>
+            </a:fillRef>
+            <a:effectRef idx="0">
+              <a:schemeClr val="accent1"/>
+            </a:effectRef>
+            <a:fontRef idx="minor">
+              <a:schemeClr val="lt1"/>
+            </a:fontRef>
+          </p:style>
+          <p:txBody>
+            <a:bodyPr rtlCol="0" anchor="ctr"/>
+            <a:lstStyle/>
+            <a:p>
+              <a:pPr algn="ctr"/>
+              <a:endParaRPr lang="en-US">
+                <a:noFill/>
+              </a:endParaRPr>
+            </a:p>
+          </p:txBody>
+        </p:sp>
+        <p:sp>
+          <p:nvSpPr>
+            <p:cNvPr id="46" name="Rettangolo 45"/>
+            <p:cNvSpPr/>
+            <p:nvPr/>
+          </p:nvSpPr>
+          <p:spPr>
+            <a:xfrm>
+              <a:off x="3596456" y="4466926"/>
+              <a:ext cx="306000" cy="306000"/>
+            </a:xfrm>
+            <a:prstGeom prst="rect">
+              <a:avLst/>
+            </a:prstGeom>
+            <a:solidFill>
+              <a:srgbClr val="191940">
+                <a:alpha val="0"/>
+              </a:srgbClr>
+            </a:solidFill>
+            <a:ln w="3175"/>
+          </p:spPr>
+          <p:style>
+            <a:lnRef idx="2">
+              <a:schemeClr val="accent1">
+                <a:shade val="50000"/>
+              </a:schemeClr>
+            </a:lnRef>
+            <a:fillRef idx="1">
+              <a:schemeClr val="accent1"/>
+            </a:fillRef>
+            <a:effectRef idx="0">
+              <a:schemeClr val="accent1"/>
+            </a:effectRef>
+            <a:fontRef idx="minor">
+              <a:schemeClr val="lt1"/>
+            </a:fontRef>
+          </p:style>
+          <p:txBody>
+            <a:bodyPr rtlCol="0" anchor="ctr"/>
+            <a:lstStyle/>
+            <a:p>
+              <a:pPr algn="ctr"/>
+              <a:endParaRPr lang="en-US">
+                <a:noFill/>
+              </a:endParaRPr>
+            </a:p>
+          </p:txBody>
+        </p:sp>
+        <p:sp>
+          <p:nvSpPr>
+            <p:cNvPr id="47" name="Rettangolo 46"/>
+            <p:cNvSpPr/>
+            <p:nvPr/>
+          </p:nvSpPr>
+          <p:spPr>
+            <a:xfrm>
+              <a:off x="3901856" y="4467526"/>
+              <a:ext cx="306000" cy="306000"/>
+            </a:xfrm>
+            <a:prstGeom prst="rect">
+              <a:avLst/>
+            </a:prstGeom>
+            <a:solidFill>
+              <a:srgbClr val="191940">
+                <a:alpha val="0"/>
+              </a:srgbClr>
+            </a:solidFill>
+            <a:ln w="3175"/>
+          </p:spPr>
+          <p:style>
+            <a:lnRef idx="2">
+              <a:schemeClr val="accent1">
+                <a:shade val="50000"/>
+              </a:schemeClr>
+            </a:lnRef>
+            <a:fillRef idx="1">
+              <a:schemeClr val="accent1"/>
+            </a:fillRef>
+            <a:effectRef idx="0">
+              <a:schemeClr val="accent1"/>
+            </a:effectRef>
+            <a:fontRef idx="minor">
+              <a:schemeClr val="lt1"/>
+            </a:fontRef>
+          </p:style>
+          <p:txBody>
+            <a:bodyPr rtlCol="0" anchor="ctr"/>
+            <a:lstStyle/>
+            <a:p>
+              <a:pPr algn="ctr"/>
+              <a:endParaRPr lang="en-US">
+                <a:noFill/>
+              </a:endParaRPr>
+            </a:p>
+          </p:txBody>
+        </p:sp>
+        <p:sp>
+          <p:nvSpPr>
+            <p:cNvPr id="48" name="Rettangolo 47"/>
+            <p:cNvSpPr/>
+            <p:nvPr/>
+          </p:nvSpPr>
+          <p:spPr>
+            <a:xfrm>
+              <a:off x="3291056" y="4773206"/>
+              <a:ext cx="306000" cy="306000"/>
+            </a:xfrm>
+            <a:prstGeom prst="rect">
+              <a:avLst/>
+            </a:prstGeom>
+            <a:solidFill>
+              <a:srgbClr val="191940">
+                <a:alpha val="0"/>
+              </a:srgbClr>
+            </a:solidFill>
+            <a:ln w="3175"/>
+          </p:spPr>
+          <p:style>
+            <a:lnRef idx="2">
+              <a:schemeClr val="accent1">
+                <a:shade val="50000"/>
+              </a:schemeClr>
+            </a:lnRef>
+            <a:fillRef idx="1">
+              <a:schemeClr val="accent1"/>
+            </a:fillRef>
+            <a:effectRef idx="0">
+              <a:schemeClr val="accent1"/>
+            </a:effectRef>
+            <a:fontRef idx="minor">
+              <a:schemeClr val="lt1"/>
+            </a:fontRef>
+          </p:style>
+          <p:txBody>
+            <a:bodyPr rtlCol="0" anchor="ctr"/>
+            <a:lstStyle/>
+            <a:p>
+              <a:pPr algn="ctr"/>
+              <a:endParaRPr lang="en-US">
+                <a:noFill/>
+              </a:endParaRPr>
+            </a:p>
+          </p:txBody>
+        </p:sp>
+        <p:sp>
+          <p:nvSpPr>
+            <p:cNvPr id="49" name="Rettangolo 48"/>
+            <p:cNvSpPr/>
+            <p:nvPr/>
+          </p:nvSpPr>
+          <p:spPr>
+            <a:xfrm>
+              <a:off x="3596456" y="4777686"/>
+              <a:ext cx="306000" cy="301520"/>
+            </a:xfrm>
+            <a:prstGeom prst="rect">
+              <a:avLst/>
+            </a:prstGeom>
+            <a:solidFill>
+              <a:srgbClr val="191940">
+                <a:alpha val="0"/>
+              </a:srgbClr>
+            </a:solidFill>
+            <a:ln w="3175"/>
+          </p:spPr>
+          <p:style>
+            <a:lnRef idx="2">
+              <a:schemeClr val="accent1">
+                <a:shade val="50000"/>
+              </a:schemeClr>
+            </a:lnRef>
+            <a:fillRef idx="1">
+              <a:schemeClr val="accent1"/>
+            </a:fillRef>
+            <a:effectRef idx="0">
+              <a:schemeClr val="accent1"/>
+            </a:effectRef>
+            <a:fontRef idx="minor">
+              <a:schemeClr val="lt1"/>
+            </a:fontRef>
+          </p:style>
+          <p:txBody>
+            <a:bodyPr rtlCol="0" anchor="ctr"/>
+            <a:lstStyle/>
+            <a:p>
+              <a:pPr algn="ctr"/>
+              <a:endParaRPr lang="en-US">
+                <a:noFill/>
+              </a:endParaRPr>
+            </a:p>
+          </p:txBody>
+        </p:sp>
+        <p:sp>
+          <p:nvSpPr>
+            <p:cNvPr id="50" name="Rettangolo 49"/>
+            <p:cNvSpPr/>
+            <p:nvPr/>
+          </p:nvSpPr>
+          <p:spPr>
+            <a:xfrm>
+              <a:off x="3901856" y="4773206"/>
+              <a:ext cx="306000" cy="306000"/>
+            </a:xfrm>
+            <a:prstGeom prst="rect">
+              <a:avLst/>
+            </a:prstGeom>
+            <a:solidFill>
+              <a:srgbClr val="191940">
+                <a:alpha val="0"/>
+              </a:srgbClr>
+            </a:solidFill>
+            <a:ln w="3175"/>
+          </p:spPr>
+          <p:style>
+            <a:lnRef idx="2">
+              <a:schemeClr val="accent1">
+                <a:shade val="50000"/>
+              </a:schemeClr>
+            </a:lnRef>
+            <a:fillRef idx="1">
+              <a:schemeClr val="accent1"/>
+            </a:fillRef>
+            <a:effectRef idx="0">
+              <a:schemeClr val="accent1"/>
+            </a:effectRef>
+            <a:fontRef idx="minor">
+              <a:schemeClr val="lt1"/>
+            </a:fontRef>
+          </p:style>
+          <p:txBody>
+            <a:bodyPr rtlCol="0" anchor="ctr"/>
+            <a:lstStyle/>
+            <a:p>
+              <a:pPr algn="ctr"/>
+              <a:endParaRPr lang="en-US">
+                <a:noFill/>
+              </a:endParaRPr>
+            </a:p>
+          </p:txBody>
+        </p:sp>
+        <p:sp>
+          <p:nvSpPr>
+            <p:cNvPr id="51" name="Rettangolo 50"/>
+            <p:cNvSpPr/>
+            <p:nvPr/>
+          </p:nvSpPr>
+          <p:spPr>
+            <a:xfrm>
+              <a:off x="3290456" y="5077946"/>
+              <a:ext cx="306000" cy="306000"/>
+            </a:xfrm>
+            <a:prstGeom prst="rect">
+              <a:avLst/>
+            </a:prstGeom>
+            <a:solidFill>
+              <a:srgbClr val="191940">
+                <a:alpha val="0"/>
+              </a:srgbClr>
+            </a:solidFill>
+            <a:ln w="3175"/>
+          </p:spPr>
+          <p:style>
+            <a:lnRef idx="2">
+              <a:schemeClr val="accent1">
+                <a:shade val="50000"/>
+              </a:schemeClr>
+            </a:lnRef>
+            <a:fillRef idx="1">
+              <a:schemeClr val="accent1"/>
+            </a:fillRef>
+            <a:effectRef idx="0">
+              <a:schemeClr val="accent1"/>
+            </a:effectRef>
+            <a:fontRef idx="minor">
+              <a:schemeClr val="lt1"/>
+            </a:fontRef>
+          </p:style>
+          <p:txBody>
+            <a:bodyPr rtlCol="0" anchor="ctr"/>
+            <a:lstStyle/>
+            <a:p>
+              <a:pPr algn="ctr"/>
+              <a:endParaRPr lang="en-US">
+                <a:noFill/>
+              </a:endParaRPr>
+            </a:p>
+          </p:txBody>
+        </p:sp>
+        <p:sp>
+          <p:nvSpPr>
+            <p:cNvPr id="52" name="Rettangolo 51"/>
+            <p:cNvSpPr/>
+            <p:nvPr/>
+          </p:nvSpPr>
+          <p:spPr>
+            <a:xfrm>
+              <a:off x="3595856" y="5082426"/>
+              <a:ext cx="306000" cy="301520"/>
+            </a:xfrm>
+            <a:prstGeom prst="rect">
+              <a:avLst/>
+            </a:prstGeom>
+            <a:solidFill>
+              <a:srgbClr val="191940">
+                <a:alpha val="0"/>
+              </a:srgbClr>
+            </a:solidFill>
+            <a:ln w="3175"/>
+          </p:spPr>
+          <p:style>
+            <a:lnRef idx="2">
+              <a:schemeClr val="accent1">
+                <a:shade val="50000"/>
+              </a:schemeClr>
+            </a:lnRef>
+            <a:fillRef idx="1">
+              <a:schemeClr val="accent1"/>
+            </a:fillRef>
+            <a:effectRef idx="0">
+              <a:schemeClr val="accent1"/>
+            </a:effectRef>
+            <a:fontRef idx="minor">
+              <a:schemeClr val="lt1"/>
+            </a:fontRef>
+          </p:style>
+          <p:txBody>
+            <a:bodyPr rtlCol="0" anchor="ctr"/>
+            <a:lstStyle/>
+            <a:p>
+              <a:pPr algn="ctr"/>
+              <a:endParaRPr lang="en-US">
+                <a:noFill/>
+              </a:endParaRPr>
+            </a:p>
+          </p:txBody>
+        </p:sp>
+        <p:sp>
+          <p:nvSpPr>
+            <p:cNvPr id="53" name="Rettangolo 52"/>
+            <p:cNvSpPr/>
+            <p:nvPr/>
+          </p:nvSpPr>
+          <p:spPr>
+            <a:xfrm>
+              <a:off x="3901256" y="5077946"/>
+              <a:ext cx="306000" cy="306000"/>
+            </a:xfrm>
+            <a:prstGeom prst="rect">
+              <a:avLst/>
+            </a:prstGeom>
+            <a:solidFill>
+              <a:srgbClr val="191940">
+                <a:alpha val="0"/>
+              </a:srgbClr>
+            </a:solidFill>
+            <a:ln w="3175"/>
+          </p:spPr>
+          <p:style>
+            <a:lnRef idx="2">
+              <a:schemeClr val="accent1">
+                <a:shade val="50000"/>
+              </a:schemeClr>
+            </a:lnRef>
+            <a:fillRef idx="1">
+              <a:schemeClr val="accent1"/>
+            </a:fillRef>
+            <a:effectRef idx="0">
+              <a:schemeClr val="accent1"/>
+            </a:effectRef>
+            <a:fontRef idx="minor">
+              <a:schemeClr val="lt1"/>
+            </a:fontRef>
+          </p:style>
+          <p:txBody>
+            <a:bodyPr rtlCol="0" anchor="ctr"/>
+            <a:lstStyle/>
+            <a:p>
+              <a:pPr algn="ctr"/>
+              <a:endParaRPr lang="en-US">
+                <a:noFill/>
+              </a:endParaRPr>
+            </a:p>
+          </p:txBody>
+        </p:sp>
+      </p:grpSp>
+      <p:grpSp>
+        <p:nvGrpSpPr>
+          <p:cNvPr id="18" name="Gruppo 17"/>
+          <p:cNvGrpSpPr/>
+          <p:nvPr/>
+        </p:nvGrpSpPr>
+        <p:grpSpPr>
+          <a:xfrm>
+            <a:off x="6156176" y="4530020"/>
+            <a:ext cx="1291287" cy="1403420"/>
+            <a:chOff x="6156176" y="4530020"/>
+            <a:chExt cx="1291287" cy="1403420"/>
+          </a:xfrm>
+        </p:grpSpPr>
+        <p:sp>
+          <p:nvSpPr>
+            <p:cNvPr id="31" name="Rettangolo 30"/>
+            <p:cNvSpPr/>
+            <p:nvPr/>
+          </p:nvSpPr>
+          <p:spPr>
+            <a:xfrm>
+              <a:off x="6156176" y="4530020"/>
+              <a:ext cx="1260000" cy="1260000"/>
+            </a:xfrm>
+            <a:prstGeom prst="rect">
+              <a:avLst/>
+            </a:prstGeom>
+            <a:solidFill>
+              <a:srgbClr val="191940">
+                <a:alpha val="0"/>
+              </a:srgbClr>
+            </a:solidFill>
+            <a:ln w="3175"/>
+          </p:spPr>
+          <p:style>
+            <a:lnRef idx="2">
+              <a:schemeClr val="accent1">
+                <a:shade val="50000"/>
+              </a:schemeClr>
+            </a:lnRef>
+            <a:fillRef idx="1">
+              <a:schemeClr val="accent1"/>
+            </a:fillRef>
+            <a:effectRef idx="0">
+              <a:schemeClr val="accent1"/>
+            </a:effectRef>
+            <a:fontRef idx="minor">
+              <a:schemeClr val="lt1"/>
+            </a:fontRef>
+          </p:style>
+          <p:txBody>
+            <a:bodyPr rtlCol="0" anchor="ctr"/>
+            <a:lstStyle/>
+            <a:p>
+              <a:pPr algn="ctr"/>
+              <a:endParaRPr lang="en-US">
+                <a:noFill/>
+              </a:endParaRPr>
+            </a:p>
+          </p:txBody>
+        </p:sp>
+        <p:sp>
+          <p:nvSpPr>
+            <p:cNvPr id="3" name="Cubo 2"/>
+            <p:cNvSpPr/>
+            <p:nvPr/>
+          </p:nvSpPr>
+          <p:spPr>
+            <a:xfrm>
+              <a:off x="6518914" y="4890020"/>
+              <a:ext cx="540000" cy="540000"/>
+            </a:xfrm>
+            <a:prstGeom prst="cube">
+              <a:avLst/>
+            </a:prstGeom>
+          </p:spPr>
+          <p:style>
+            <a:lnRef idx="1">
+              <a:schemeClr val="accent1"/>
+            </a:lnRef>
+            <a:fillRef idx="2">
+              <a:schemeClr val="accent1"/>
+            </a:fillRef>
+            <a:effectRef idx="1">
+              <a:schemeClr val="accent1"/>
+            </a:effectRef>
+            <a:fontRef idx="minor">
+              <a:schemeClr val="dk1"/>
+            </a:fontRef>
+          </p:style>
+          <p:txBody>
+            <a:bodyPr rtlCol="0" anchor="ctr"/>
+            <a:lstStyle/>
+            <a:p>
+              <a:pPr algn="ctr"/>
+              <a:endParaRPr lang="en-US"/>
+            </a:p>
+          </p:txBody>
+        </p:sp>
+        <p:pic>
+          <p:nvPicPr>
+            <p:cNvPr id="32" name="Immagine 31"/>
+            <p:cNvPicPr>
+              <a:picLocks noChangeAspect="1"/>
+            </p:cNvPicPr>
+            <p:nvPr/>
+          </p:nvPicPr>
+          <p:blipFill>
+            <a:blip r:embed="rId5" cstate="print">
+              <a:extLst>
+                <a:ext uri="{28A0092B-C50C-407E-A947-70E740481C1C}">
+                  <a14:useLocalDpi xmlns:a14="http://schemas.microsoft.com/office/drawing/2010/main" val="0"/>
+                </a:ext>
+              </a:extLst>
+            </a:blip>
+            <a:stretch>
+              <a:fillRect/>
+            </a:stretch>
+          </p:blipFill>
+          <p:spPr>
+            <a:xfrm>
+              <a:off x="6246176" y="4638440"/>
+              <a:ext cx="144000" cy="144000"/>
+            </a:xfrm>
+            <a:prstGeom prst="rect">
+              <a:avLst/>
+            </a:prstGeom>
+          </p:spPr>
+        </p:pic>
+        <p:pic>
+          <p:nvPicPr>
+            <p:cNvPr id="33" name="Immagine 32"/>
+            <p:cNvPicPr>
+              <a:picLocks noChangeAspect="1"/>
+            </p:cNvPicPr>
+            <p:nvPr/>
+          </p:nvPicPr>
+          <p:blipFill>
+            <a:blip r:embed="rId5" cstate="print">
+              <a:extLst>
+                <a:ext uri="{28A0092B-C50C-407E-A947-70E740481C1C}">
+                  <a14:useLocalDpi xmlns:a14="http://schemas.microsoft.com/office/drawing/2010/main" val="0"/>
+                </a:ext>
+              </a:extLst>
+            </a:blip>
+            <a:stretch>
+              <a:fillRect/>
+            </a:stretch>
+          </p:blipFill>
+          <p:spPr>
+            <a:xfrm>
+              <a:off x="6246176" y="4937480"/>
+              <a:ext cx="144000" cy="144000"/>
+            </a:xfrm>
+            <a:prstGeom prst="rect">
+              <a:avLst/>
+            </a:prstGeom>
+          </p:spPr>
+        </p:pic>
+        <p:pic>
+          <p:nvPicPr>
+            <p:cNvPr id="34" name="Immagine 33"/>
+            <p:cNvPicPr>
+              <a:picLocks noChangeAspect="1"/>
+            </p:cNvPicPr>
+            <p:nvPr/>
+          </p:nvPicPr>
+          <p:blipFill>
+            <a:blip r:embed="rId5" cstate="print">
+              <a:extLst>
+                <a:ext uri="{28A0092B-C50C-407E-A947-70E740481C1C}">
+                  <a14:useLocalDpi xmlns:a14="http://schemas.microsoft.com/office/drawing/2010/main" val="0"/>
+                </a:ext>
+              </a:extLst>
+            </a:blip>
+            <a:stretch>
+              <a:fillRect/>
+            </a:stretch>
+          </p:blipFill>
+          <p:spPr>
+            <a:xfrm>
+              <a:off x="6246176" y="5246380"/>
+              <a:ext cx="144000" cy="144000"/>
+            </a:xfrm>
+            <a:prstGeom prst="rect">
+              <a:avLst/>
+            </a:prstGeom>
+          </p:spPr>
+        </p:pic>
+        <p:pic>
+          <p:nvPicPr>
+            <p:cNvPr id="36" name="Immagine 35"/>
+            <p:cNvPicPr>
+              <a:picLocks noChangeAspect="1"/>
+            </p:cNvPicPr>
+            <p:nvPr/>
+          </p:nvPicPr>
+          <p:blipFill>
+            <a:blip r:embed="rId5" cstate="print">
+              <a:extLst>
+                <a:ext uri="{28A0092B-C50C-407E-A947-70E740481C1C}">
+                  <a14:useLocalDpi xmlns:a14="http://schemas.microsoft.com/office/drawing/2010/main" val="0"/>
+                </a:ext>
+              </a:extLst>
+            </a:blip>
+            <a:stretch>
+              <a:fillRect/>
+            </a:stretch>
+          </p:blipFill>
+          <p:spPr>
+            <a:xfrm>
+              <a:off x="6556656" y="4638440"/>
+              <a:ext cx="144000" cy="144000"/>
+            </a:xfrm>
+            <a:prstGeom prst="rect">
+              <a:avLst/>
+            </a:prstGeom>
+          </p:spPr>
+        </p:pic>
+        <p:pic>
+          <p:nvPicPr>
+            <p:cNvPr id="37" name="Immagine 36"/>
+            <p:cNvPicPr>
+              <a:picLocks noChangeAspect="1"/>
+            </p:cNvPicPr>
+            <p:nvPr/>
+          </p:nvPicPr>
+          <p:blipFill>
+            <a:blip r:embed="rId5" cstate="print">
+              <a:extLst>
+                <a:ext uri="{28A0092B-C50C-407E-A947-70E740481C1C}">
+                  <a14:useLocalDpi xmlns:a14="http://schemas.microsoft.com/office/drawing/2010/main" val="0"/>
+                </a:ext>
+              </a:extLst>
+            </a:blip>
+            <a:stretch>
+              <a:fillRect/>
+            </a:stretch>
+          </p:blipFill>
+          <p:spPr>
+            <a:xfrm>
+              <a:off x="7166936" y="4638440"/>
+              <a:ext cx="144000" cy="144000"/>
+            </a:xfrm>
+            <a:prstGeom prst="rect">
+              <a:avLst/>
+            </a:prstGeom>
+          </p:spPr>
+        </p:pic>
+        <p:pic>
+          <p:nvPicPr>
+            <p:cNvPr id="38" name="Immagine 37"/>
+            <p:cNvPicPr>
+              <a:picLocks noChangeAspect="1"/>
+            </p:cNvPicPr>
+            <p:nvPr/>
+          </p:nvPicPr>
+          <p:blipFill>
+            <a:blip r:embed="rId5" cstate="print">
+              <a:extLst>
+                <a:ext uri="{28A0092B-C50C-407E-A947-70E740481C1C}">
+                  <a14:useLocalDpi xmlns:a14="http://schemas.microsoft.com/office/drawing/2010/main" val="0"/>
+                </a:ext>
+              </a:extLst>
+            </a:blip>
+            <a:stretch>
+              <a:fillRect/>
+            </a:stretch>
+          </p:blipFill>
+          <p:spPr>
+            <a:xfrm>
+              <a:off x="7166936" y="4942560"/>
+              <a:ext cx="144000" cy="144000"/>
+            </a:xfrm>
+            <a:prstGeom prst="rect">
+              <a:avLst/>
+            </a:prstGeom>
+          </p:spPr>
+        </p:pic>
+        <p:pic>
+          <p:nvPicPr>
+            <p:cNvPr id="2" name="Picture 2" descr="http://setsite.co/wp-content/uploads/2012/11/blue-eye.png"/>
+            <p:cNvPicPr>
+              <a:picLocks noChangeAspect="1" noChangeArrowheads="1"/>
+            </p:cNvPicPr>
+            <p:nvPr/>
+          </p:nvPicPr>
+          <p:blipFill>
+            <a:blip r:embed="rId6" cstate="print">
+              <a:extLst>
+                <a:ext uri="{28A0092B-C50C-407E-A947-70E740481C1C}">
+                  <a14:useLocalDpi xmlns:a14="http://schemas.microsoft.com/office/drawing/2010/main" val="0"/>
+                </a:ext>
+              </a:extLst>
+            </a:blip>
+            <a:srcRect/>
+            <a:stretch>
+              <a:fillRect/>
+            </a:stretch>
+          </p:blipFill>
+          <p:spPr bwMode="auto">
+            <a:xfrm>
+              <a:off x="6650294" y="5171636"/>
+              <a:ext cx="797169" cy="761804"/>
+            </a:xfrm>
+            <a:prstGeom prst="rect">
+              <a:avLst/>
+            </a:prstGeom>
+            <a:noFill/>
+            <a:extLst>
+              <a:ext uri="{909E8E84-426E-40DD-AFC4-6F175D3DCCD1}">
+                <a14:hiddenFill xmlns:a14="http://schemas.microsoft.com/office/drawing/2010/main">
+                  <a:solidFill>
+                    <a:srgbClr val="FFFFFF"/>
+                  </a:solidFill>
+                </a14:hiddenFill>
+              </a:ext>
+            </a:extLst>
+          </p:spPr>
+        </p:pic>
+        <p:pic>
+          <p:nvPicPr>
+            <p:cNvPr id="42" name="Immagine 41"/>
+            <p:cNvPicPr>
+              <a:picLocks noChangeAspect="1"/>
+            </p:cNvPicPr>
+            <p:nvPr/>
+          </p:nvPicPr>
+          <p:blipFill>
+            <a:blip r:embed="rId5" cstate="print">
+              <a:extLst>
+                <a:ext uri="{28A0092B-C50C-407E-A947-70E740481C1C}">
+                  <a14:useLocalDpi xmlns:a14="http://schemas.microsoft.com/office/drawing/2010/main" val="0"/>
+                </a:ext>
+              </a:extLst>
+            </a:blip>
+            <a:stretch>
+              <a:fillRect/>
+            </a:stretch>
+          </p:blipFill>
+          <p:spPr>
+            <a:xfrm>
+              <a:off x="6864238" y="4638440"/>
+              <a:ext cx="144000" cy="144000"/>
+            </a:xfrm>
+            <a:prstGeom prst="rect">
+              <a:avLst/>
+            </a:prstGeom>
+          </p:spPr>
+        </p:pic>
+        <p:pic>
+          <p:nvPicPr>
+            <p:cNvPr id="54" name="Immagine 53"/>
+            <p:cNvPicPr>
+              <a:picLocks noChangeAspect="1"/>
+            </p:cNvPicPr>
+            <p:nvPr/>
+          </p:nvPicPr>
+          <p:blipFill>
+            <a:blip r:embed="rId5" cstate="print">
+              <a:extLst>
+                <a:ext uri="{28A0092B-C50C-407E-A947-70E740481C1C}">
+                  <a14:useLocalDpi xmlns:a14="http://schemas.microsoft.com/office/drawing/2010/main" val="0"/>
+                </a:ext>
+              </a:extLst>
+            </a:blip>
+            <a:stretch>
+              <a:fillRect/>
+            </a:stretch>
+          </p:blipFill>
+          <p:spPr>
+            <a:xfrm>
+              <a:off x="6246176" y="5555460"/>
+              <a:ext cx="144000" cy="144000"/>
+            </a:xfrm>
+            <a:prstGeom prst="rect">
+              <a:avLst/>
+            </a:prstGeom>
+          </p:spPr>
+        </p:pic>
+        <p:pic>
+          <p:nvPicPr>
+            <p:cNvPr id="55" name="Immagine 54"/>
+            <p:cNvPicPr>
+              <a:picLocks noChangeAspect="1"/>
+            </p:cNvPicPr>
+            <p:nvPr/>
+          </p:nvPicPr>
+          <p:blipFill>
+            <a:blip r:embed="rId5" cstate="print">
+              <a:extLst>
+                <a:ext uri="{28A0092B-C50C-407E-A947-70E740481C1C}">
+                  <a14:useLocalDpi xmlns:a14="http://schemas.microsoft.com/office/drawing/2010/main" val="0"/>
+                </a:ext>
+              </a:extLst>
+            </a:blip>
+            <a:stretch>
+              <a:fillRect/>
+            </a:stretch>
+          </p:blipFill>
+          <p:spPr>
+            <a:xfrm>
+              <a:off x="6556470" y="5564858"/>
+              <a:ext cx="144000" cy="144000"/>
+            </a:xfrm>
+            <a:prstGeom prst="rect">
+              <a:avLst/>
+            </a:prstGeom>
+          </p:spPr>
+        </p:pic>
+        <p:pic>
+          <p:nvPicPr>
+            <p:cNvPr id="57" name="Immagine 56"/>
+            <p:cNvPicPr>
+              <a:picLocks noChangeAspect="1"/>
+            </p:cNvPicPr>
+            <p:nvPr/>
+          </p:nvPicPr>
+          <p:blipFill>
+            <a:blip r:embed="rId5" cstate="print">
+              <a:extLst>
+                <a:ext uri="{28A0092B-C50C-407E-A947-70E740481C1C}">
+                  <a14:useLocalDpi xmlns:a14="http://schemas.microsoft.com/office/drawing/2010/main" val="0"/>
+                </a:ext>
+              </a:extLst>
+            </a:blip>
+            <a:stretch>
+              <a:fillRect/>
+            </a:stretch>
+          </p:blipFill>
+          <p:spPr>
+            <a:xfrm>
+              <a:off x="7166936" y="5247456"/>
+              <a:ext cx="144000" cy="144000"/>
+            </a:xfrm>
+            <a:prstGeom prst="rect">
+              <a:avLst/>
+            </a:prstGeom>
+          </p:spPr>
+        </p:pic>
+      </p:grpSp>
+      <p:sp>
+        <p:nvSpPr>
+          <p:cNvPr id="58" name="Rettangolo 57"/>
+          <p:cNvSpPr/>
+          <p:nvPr/>
+        </p:nvSpPr>
+        <p:spPr>
+          <a:xfrm>
+            <a:off x="4739496" y="5365538"/>
+            <a:ext cx="306000" cy="306000"/>
+          </a:xfrm>
+          <a:prstGeom prst="rect">
+            <a:avLst/>
+          </a:prstGeom>
+          <a:solidFill>
+            <a:srgbClr val="191940">
+              <a:alpha val="0"/>
+            </a:srgbClr>
+          </a:solidFill>
+          <a:ln w="3175"/>
+        </p:spPr>
+        <p:style>
+          <a:lnRef idx="2">
+            <a:schemeClr val="accent1">
+              <a:shade val="50000"/>
+            </a:schemeClr>
+          </a:lnRef>
+          <a:fillRef idx="1">
+            <a:schemeClr val="accent1"/>
+          </a:fillRef>
+          <a:effectRef idx="0">
+            <a:schemeClr val="accent1"/>
+          </a:effectRef>
+          <a:fontRef idx="minor">
+            <a:schemeClr val="lt1"/>
+          </a:fontRef>
+        </p:style>
+        <p:txBody>
+          <a:bodyPr rtlCol="0" anchor="ctr"/>
+          <a:lstStyle/>
+          <a:p>
+            <a:pPr algn="ctr"/>
+            <a:endParaRPr lang="en-US">
+              <a:noFill/>
+            </a:endParaRPr>
+          </a:p>
+        </p:txBody>
+      </p:sp>
     </p:spTree>
     <p:extLst>
       <p:ext uri="{BB962C8B-B14F-4D97-AF65-F5344CB8AC3E}">
         <p14:creationId xmlns:p14="http://schemas.microsoft.com/office/powerpoint/2010/main" val="2583342014"/>
+      </p:ext>
+    </p:extLst>
+  </p:cSld>
+  <p:clrMapOvr>
+    <a:masterClrMapping/>
+  </p:clrMapOvr>
+</p:sld>
+</file>
+
+<file path=ppt/slides/slide2.xml><?xml version="1.0" encoding="utf-8"?>
+<p:sld xmlns:a="http://schemas.openxmlformats.org/drawingml/2006/main" xmlns:r="http://schemas.openxmlformats.org/officeDocument/2006/relationships" xmlns:p="http://schemas.openxmlformats.org/presentationml/2006/main">
+  <p:cSld>
+    <p:spTree>
+      <p:nvGrpSpPr>
+        <p:cNvPr id="1" name=""/>
+        <p:cNvGrpSpPr/>
+        <p:nvPr/>
+      </p:nvGrpSpPr>
+      <p:grpSpPr>
+        <a:xfrm>
+          <a:off x="0" y="0"/>
+          <a:ext cx="0" cy="0"/>
+          <a:chOff x="0" y="0"/>
+          <a:chExt cx="0" cy="0"/>
+        </a:xfrm>
+      </p:grpSpPr>
+      <p:grpSp>
+        <p:nvGrpSpPr>
+          <p:cNvPr id="10" name="Gruppo 9"/>
+          <p:cNvGrpSpPr/>
+          <p:nvPr/>
+        </p:nvGrpSpPr>
+        <p:grpSpPr>
+          <a:xfrm>
+            <a:off x="4148237" y="2150125"/>
+            <a:ext cx="1216243" cy="1221118"/>
+            <a:chOff x="4148237" y="2150125"/>
+            <a:chExt cx="1216243" cy="1221118"/>
+          </a:xfrm>
+        </p:grpSpPr>
+        <p:grpSp>
+          <p:nvGrpSpPr>
+            <p:cNvPr id="9" name="Gruppo 8"/>
+            <p:cNvGrpSpPr>
+              <a:grpSpLocks noChangeAspect="1"/>
+            </p:cNvGrpSpPr>
+            <p:nvPr/>
+          </p:nvGrpSpPr>
+          <p:grpSpPr>
+            <a:xfrm>
+              <a:off x="4611686" y="2611979"/>
+              <a:ext cx="752794" cy="759264"/>
+              <a:chOff x="4550726" y="2373219"/>
+              <a:chExt cx="1147140" cy="1156996"/>
+            </a:xfrm>
+          </p:grpSpPr>
+          <p:sp>
+            <p:nvSpPr>
+              <p:cNvPr id="7" name="Ovale 6"/>
+              <p:cNvSpPr/>
+              <p:nvPr/>
+            </p:nvSpPr>
+            <p:spPr>
+              <a:xfrm>
+                <a:off x="4550726" y="2373219"/>
+                <a:ext cx="1080000" cy="1080000"/>
+              </a:xfrm>
+              <a:prstGeom prst="ellipse">
+                <a:avLst/>
+              </a:prstGeom>
+              <a:solidFill>
+                <a:schemeClr val="accent1"/>
+              </a:solidFill>
+              <a:ln>
+                <a:noFill/>
+              </a:ln>
+              <a:effectLst/>
+              <a:scene3d>
+                <a:camera prst="isometricLeftDown">
+                  <a:rot lat="0" lon="0" rev="0"/>
+                </a:camera>
+                <a:lightRig rig="soft" dir="t"/>
+              </a:scene3d>
+              <a:sp3d prstMaterial="plastic">
+                <a:bevelT w="508000" h="508000"/>
+                <a:bevelB w="508000" h="508000" prst="coolSlant"/>
+                <a:contourClr>
+                  <a:schemeClr val="bg1"/>
+                </a:contourClr>
+              </a:sp3d>
+            </p:spPr>
+            <p:style>
+              <a:lnRef idx="2">
+                <a:schemeClr val="accent1">
+                  <a:shade val="50000"/>
+                </a:schemeClr>
+              </a:lnRef>
+              <a:fillRef idx="1">
+                <a:schemeClr val="accent1"/>
+              </a:fillRef>
+              <a:effectRef idx="0">
+                <a:schemeClr val="accent1"/>
+              </a:effectRef>
+              <a:fontRef idx="minor">
+                <a:schemeClr val="lt1"/>
+              </a:fontRef>
+            </p:style>
+            <p:txBody>
+              <a:bodyPr rtlCol="0" anchor="ctr"/>
+              <a:lstStyle/>
+              <a:p>
+                <a:pPr algn="ctr"/>
+                <a:endParaRPr lang="en-US"/>
+              </a:p>
+            </p:txBody>
+          </p:sp>
+          <p:pic>
+            <p:nvPicPr>
+              <p:cNvPr id="8" name="Picture 2" descr="C:\Users\Administrator\Downloads\add.png"/>
+              <p:cNvPicPr>
+                <a:picLocks noChangeAspect="1" noChangeArrowheads="1"/>
+              </p:cNvPicPr>
+              <p:nvPr/>
+            </p:nvPicPr>
+            <p:blipFill>
+              <a:blip r:embed="rId2" cstate="print">
+                <a:extLst>
+                  <a:ext uri="{28A0092B-C50C-407E-A947-70E740481C1C}">
+                    <a14:useLocalDpi xmlns:a14="http://schemas.microsoft.com/office/drawing/2010/main" val="0"/>
+                  </a:ext>
+                </a:extLst>
+              </a:blip>
+              <a:srcRect/>
+              <a:stretch>
+                <a:fillRect/>
+              </a:stretch>
+            </p:blipFill>
+            <p:spPr bwMode="auto">
+              <a:xfrm>
+                <a:off x="5002134" y="2834483"/>
+                <a:ext cx="695732" cy="695732"/>
+              </a:xfrm>
+              <a:prstGeom prst="rect">
+                <a:avLst/>
+              </a:prstGeom>
+              <a:noFill/>
+              <a:extLst>
+                <a:ext uri="{909E8E84-426E-40DD-AFC4-6F175D3DCCD1}">
+                  <a14:hiddenFill xmlns:a14="http://schemas.microsoft.com/office/drawing/2010/main">
+                    <a:solidFill>
+                      <a:srgbClr val="FFFFFF"/>
+                    </a:solidFill>
+                  </a14:hiddenFill>
+                </a:ext>
+              </a:extLst>
+            </p:spPr>
+          </p:pic>
+        </p:grpSp>
+        <p:pic>
+          <p:nvPicPr>
+            <p:cNvPr id="4" name="Picture 3" descr="C:\Users\Administrator\Downloads\114977-magic-marker-icon-business-cursor.png"/>
+            <p:cNvPicPr>
+              <a:picLocks noChangeAspect="1" noChangeArrowheads="1"/>
+            </p:cNvPicPr>
+            <p:nvPr/>
+          </p:nvPicPr>
+          <p:blipFill>
+            <a:blip r:embed="rId3" cstate="print">
+              <a:extLst>
+                <a:ext uri="{28A0092B-C50C-407E-A947-70E740481C1C}">
+                  <a14:useLocalDpi xmlns:a14="http://schemas.microsoft.com/office/drawing/2010/main" val="0"/>
+                </a:ext>
+              </a:extLst>
+            </a:blip>
+            <a:srcRect/>
+            <a:stretch>
+              <a:fillRect/>
+            </a:stretch>
+          </p:blipFill>
+          <p:spPr bwMode="auto">
+            <a:xfrm>
+              <a:off x="4148237" y="2150125"/>
+              <a:ext cx="1088104" cy="1088104"/>
+            </a:xfrm>
+            <a:prstGeom prst="rect">
+              <a:avLst/>
+            </a:prstGeom>
+            <a:noFill/>
+            <a:extLst>
+              <a:ext uri="{909E8E84-426E-40DD-AFC4-6F175D3DCCD1}">
+                <a14:hiddenFill xmlns:a14="http://schemas.microsoft.com/office/drawing/2010/main">
+                  <a:solidFill>
+                    <a:srgbClr val="FFFFFF"/>
+                  </a:solidFill>
+                </a14:hiddenFill>
+              </a:ext>
+            </a:extLst>
+          </p:spPr>
+        </p:pic>
+      </p:grpSp>
+    </p:spTree>
+    <p:extLst>
+      <p:ext uri="{BB962C8B-B14F-4D97-AF65-F5344CB8AC3E}">
+        <p14:creationId xmlns:p14="http://schemas.microsoft.com/office/powerpoint/2010/main" val="3000757647"/>
       </p:ext>
     </p:extLst>
   </p:cSld>

</xml_diff>

<commit_message>
added preliminary (not 100% working) version of undo/redo annotation commands
git-svn-id: https://svn.janelia.org/penglab/projects/vaa3d_tools@1363 f26c06c5-4756-4547-a2b9-0b39063de1b8
</commit_message>
<xml_diff>
--- a/released_plugins/v3d_plugins/teramanager/icons.pptx
+++ b/released_plugins/v3d_plugins/teramanager/icons.pptx
@@ -289,7 +289,7 @@
           <a:p>
             <a:fld id="{A3FFFC81-E8A9-43A5-BD7A-0818E158DC6F}" type="datetimeFigureOut">
               <a:rPr lang="en-US" smtClean="0"/>
-              <a:t>4/22/2014</a:t>
+              <a:t>6/19/2014</a:t>
             </a:fld>
             <a:endParaRPr lang="en-US"/>
           </a:p>
@@ -459,7 +459,7 @@
           <a:p>
             <a:fld id="{A3FFFC81-E8A9-43A5-BD7A-0818E158DC6F}" type="datetimeFigureOut">
               <a:rPr lang="en-US" smtClean="0"/>
-              <a:t>4/22/2014</a:t>
+              <a:t>6/19/2014</a:t>
             </a:fld>
             <a:endParaRPr lang="en-US"/>
           </a:p>
@@ -639,7 +639,7 @@
           <a:p>
             <a:fld id="{A3FFFC81-E8A9-43A5-BD7A-0818E158DC6F}" type="datetimeFigureOut">
               <a:rPr lang="en-US" smtClean="0"/>
-              <a:t>4/22/2014</a:t>
+              <a:t>6/19/2014</a:t>
             </a:fld>
             <a:endParaRPr lang="en-US"/>
           </a:p>
@@ -809,7 +809,7 @@
           <a:p>
             <a:fld id="{A3FFFC81-E8A9-43A5-BD7A-0818E158DC6F}" type="datetimeFigureOut">
               <a:rPr lang="en-US" smtClean="0"/>
-              <a:t>4/22/2014</a:t>
+              <a:t>6/19/2014</a:t>
             </a:fld>
             <a:endParaRPr lang="en-US"/>
           </a:p>
@@ -1055,7 +1055,7 @@
           <a:p>
             <a:fld id="{A3FFFC81-E8A9-43A5-BD7A-0818E158DC6F}" type="datetimeFigureOut">
               <a:rPr lang="en-US" smtClean="0"/>
-              <a:t>4/22/2014</a:t>
+              <a:t>6/19/2014</a:t>
             </a:fld>
             <a:endParaRPr lang="en-US"/>
           </a:p>
@@ -1343,7 +1343,7 @@
           <a:p>
             <a:fld id="{A3FFFC81-E8A9-43A5-BD7A-0818E158DC6F}" type="datetimeFigureOut">
               <a:rPr lang="en-US" smtClean="0"/>
-              <a:t>4/22/2014</a:t>
+              <a:t>6/19/2014</a:t>
             </a:fld>
             <a:endParaRPr lang="en-US"/>
           </a:p>
@@ -1765,7 +1765,7 @@
           <a:p>
             <a:fld id="{A3FFFC81-E8A9-43A5-BD7A-0818E158DC6F}" type="datetimeFigureOut">
               <a:rPr lang="en-US" smtClean="0"/>
-              <a:t>4/22/2014</a:t>
+              <a:t>6/19/2014</a:t>
             </a:fld>
             <a:endParaRPr lang="en-US"/>
           </a:p>
@@ -1883,7 +1883,7 @@
           <a:p>
             <a:fld id="{A3FFFC81-E8A9-43A5-BD7A-0818E158DC6F}" type="datetimeFigureOut">
               <a:rPr lang="en-US" smtClean="0"/>
-              <a:t>4/22/2014</a:t>
+              <a:t>6/19/2014</a:t>
             </a:fld>
             <a:endParaRPr lang="en-US"/>
           </a:p>
@@ -1978,7 +1978,7 @@
           <a:p>
             <a:fld id="{A3FFFC81-E8A9-43A5-BD7A-0818E158DC6F}" type="datetimeFigureOut">
               <a:rPr lang="en-US" smtClean="0"/>
-              <a:t>4/22/2014</a:t>
+              <a:t>6/19/2014</a:t>
             </a:fld>
             <a:endParaRPr lang="en-US"/>
           </a:p>
@@ -2255,7 +2255,7 @@
           <a:p>
             <a:fld id="{A3FFFC81-E8A9-43A5-BD7A-0818E158DC6F}" type="datetimeFigureOut">
               <a:rPr lang="en-US" smtClean="0"/>
-              <a:t>4/22/2014</a:t>
+              <a:t>6/19/2014</a:t>
             </a:fld>
             <a:endParaRPr lang="en-US"/>
           </a:p>
@@ -2508,7 +2508,7 @@
           <a:p>
             <a:fld id="{A3FFFC81-E8A9-43A5-BD7A-0818E158DC6F}" type="datetimeFigureOut">
               <a:rPr lang="en-US" smtClean="0"/>
-              <a:t>4/22/2014</a:t>
+              <a:t>6/19/2014</a:t>
             </a:fld>
             <a:endParaRPr lang="en-US"/>
           </a:p>
@@ -2721,7 +2721,7 @@
           <a:p>
             <a:fld id="{A3FFFC81-E8A9-43A5-BD7A-0818E158DC6F}" type="datetimeFigureOut">
               <a:rPr lang="en-US" smtClean="0"/>
-              <a:t>4/22/2014</a:t>
+              <a:t>6/19/2014</a:t>
             </a:fld>
             <a:endParaRPr lang="en-US"/>
           </a:p>
@@ -5767,7 +5767,7 @@
         </p:nvCxnSpPr>
         <p:spPr>
           <a:xfrm flipH="1">
-            <a:off x="3845560" y="1566515"/>
+            <a:off x="3845560" y="1505555"/>
             <a:ext cx="4831373" cy="0"/>
           </a:xfrm>
           <a:prstGeom prst="line">
@@ -5967,18 +5967,68 @@
           </a:p>
         </p:txBody>
       </p:sp>
+      <p:pic>
+        <p:nvPicPr>
+          <p:cNvPr id="1042" name="Picture 18" descr="D:\Vaa3D\vaa3d_tools\released_plugins\v3d_plugins\teramanager\icons\clear.jpg"/>
+          <p:cNvPicPr>
+            <a:picLocks noChangeArrowheads="1"/>
+          </p:cNvPicPr>
+          <p:nvPr/>
+        </p:nvPicPr>
+        <p:blipFill>
+          <a:blip r:embed="rId12">
+            <a:extLst>
+              <a:ext uri="{BEBA8EAE-BF5A-486C-A8C5-ECC9F3942E4B}">
+                <a14:imgProps xmlns:a14="http://schemas.microsoft.com/office/drawing/2010/main">
+                  <a14:imgLayer r:embed="rId13">
+                    <a14:imgEffect>
+                      <a14:backgroundRemoval t="4000" b="97778" l="2667" r="95111"/>
+                    </a14:imgEffect>
+                  </a14:imgLayer>
+                </a14:imgProps>
+              </a:ext>
+              <a:ext uri="{28A0092B-C50C-407E-A947-70E740481C1C}">
+                <a14:useLocalDpi xmlns:a14="http://schemas.microsoft.com/office/drawing/2010/main" val="0"/>
+              </a:ext>
+            </a:extLst>
+          </a:blip>
+          <a:srcRect/>
+          <a:stretch>
+            <a:fillRect/>
+          </a:stretch>
+        </p:blipFill>
+        <p:spPr bwMode="auto">
+          <a:xfrm>
+            <a:off x="6298113" y="2239676"/>
+            <a:ext cx="1116000" cy="1260000"/>
+          </a:xfrm>
+          <a:prstGeom prst="rect">
+            <a:avLst/>
+          </a:prstGeom>
+          <a:noFill/>
+          <a:extLst>
+            <a:ext uri="{909E8E84-426E-40DD-AFC4-6F175D3DCCD1}">
+              <a14:hiddenFill xmlns:a14="http://schemas.microsoft.com/office/drawing/2010/main">
+                <a:solidFill>
+                  <a:srgbClr val="FFFFFF"/>
+                </a:solidFill>
+              </a14:hiddenFill>
+            </a:ext>
+          </a:extLst>
+        </p:spPr>
+      </p:pic>
       <p:grpSp>
         <p:nvGrpSpPr>
-          <p:cNvPr id="79" name="Gruppo 78"/>
+          <p:cNvPr id="4" name="Gruppo 3"/>
           <p:cNvGrpSpPr/>
           <p:nvPr/>
         </p:nvGrpSpPr>
         <p:grpSpPr>
           <a:xfrm>
             <a:off x="6154113" y="332656"/>
-            <a:ext cx="1260000" cy="1275544"/>
+            <a:ext cx="1260000" cy="1260000"/>
             <a:chOff x="6154113" y="332656"/>
-            <a:chExt cx="1260000" cy="1275544"/>
+            <a:chExt cx="1260000" cy="1260000"/>
           </a:xfrm>
         </p:grpSpPr>
         <p:sp>
@@ -6027,24 +6077,15 @@
         </p:sp>
         <p:pic>
           <p:nvPicPr>
-            <p:cNvPr id="1042" name="Picture 18" descr="D:\Vaa3D\vaa3d_tools\released_plugins\v3d_plugins\teramanager\icons\clear.jpg"/>
+            <p:cNvPr id="2" name="Picture 2" descr="http://icons.iconarchive.com/icons/visualpharm/must-have/256/Undo-icon.png"/>
             <p:cNvPicPr>
-              <a:picLocks noChangeArrowheads="1"/>
+              <a:picLocks noChangeAspect="1" noChangeArrowheads="1"/>
             </p:cNvPicPr>
             <p:nvPr/>
           </p:nvPicPr>
           <p:blipFill>
-            <a:blip r:embed="rId12">
+            <a:blip r:embed="rId14">
               <a:extLst>
-                <a:ext uri="{BEBA8EAE-BF5A-486C-A8C5-ECC9F3942E4B}">
-                  <a14:imgProps xmlns:a14="http://schemas.microsoft.com/office/drawing/2010/main">
-                    <a14:imgLayer r:embed="rId13">
-                      <a14:imgEffect>
-                        <a14:backgroundRemoval t="4000" b="97778" l="2667" r="95111"/>
-                      </a14:imgEffect>
-                    </a14:imgLayer>
-                  </a14:imgProps>
-                </a:ext>
                 <a:ext uri="{28A0092B-C50C-407E-A947-70E740481C1C}">
                   <a14:useLocalDpi xmlns:a14="http://schemas.microsoft.com/office/drawing/2010/main" val="0"/>
                 </a:ext>
@@ -6057,8 +6098,8 @@
           </p:blipFill>
           <p:spPr bwMode="auto">
             <a:xfrm>
-              <a:off x="6257134" y="348200"/>
-              <a:ext cx="1116000" cy="1260000"/>
+              <a:off x="6256110" y="453824"/>
+              <a:ext cx="1080000" cy="1080000"/>
             </a:xfrm>
             <a:prstGeom prst="rect">
               <a:avLst/>

</xml_diff>

<commit_message>
Vaa3D-TeraFly version 1.1.10 April 15th, 2015 -------------------------------------------------------------------------------------------- - Opt: minor GUI changes. - New: TeraFly's annotation toolbar size is adjusted according to the 3D viewer size. - New: added "2-right-clicks" pinpointing to TeraFly's annotation toolbar. - Fix: fixed bug causing annotated markers to be erased throughout the image exploration. - Fix: various bug fixes for volume opening. --------------------------------------------------------------------------------------------
git-svn-id: https://svn.janelia.org/penglab/projects/vaa3d_tools@2342 f26c06c5-4756-4547-a2b9-0b39063de1b8
</commit_message>
<xml_diff>
--- a/released_plugins/v3d_plugins/teramanager/icons.pptx
+++ b/released_plugins/v3d_plugins/teramanager/icons.pptx
@@ -105,6 +105,22 @@
       </a:defRPr>
     </a:lvl9pPr>
   </p:defaultTextStyle>
+  <p:extLst>
+    <p:ext uri="{EFAFB233-063F-42B5-8137-9DF3F51BA10A}">
+      <p15:sldGuideLst xmlns:p15="http://schemas.microsoft.com/office/powerpoint/2012/main">
+        <p15:guide id="1" orient="horz" pos="2160">
+          <p15:clr>
+            <a:srgbClr val="A4A3A4"/>
+          </p15:clr>
+        </p15:guide>
+        <p15:guide id="2" pos="2880">
+          <p15:clr>
+            <a:srgbClr val="A4A3A4"/>
+          </p15:clr>
+        </p15:guide>
+      </p15:sldGuideLst>
+    </p:ext>
+  </p:extLst>
 </p:presentation>
 </file>
 
@@ -289,7 +305,7 @@
           <a:p>
             <a:fld id="{A3FFFC81-E8A9-43A5-BD7A-0818E158DC6F}" type="datetimeFigureOut">
               <a:rPr lang="en-US" smtClean="0"/>
-              <a:t>6/23/2014</a:t>
+              <a:t>4/15/2015</a:t>
             </a:fld>
             <a:endParaRPr lang="en-US"/>
           </a:p>
@@ -459,7 +475,7 @@
           <a:p>
             <a:fld id="{A3FFFC81-E8A9-43A5-BD7A-0818E158DC6F}" type="datetimeFigureOut">
               <a:rPr lang="en-US" smtClean="0"/>
-              <a:t>6/23/2014</a:t>
+              <a:t>4/15/2015</a:t>
             </a:fld>
             <a:endParaRPr lang="en-US"/>
           </a:p>
@@ -639,7 +655,7 @@
           <a:p>
             <a:fld id="{A3FFFC81-E8A9-43A5-BD7A-0818E158DC6F}" type="datetimeFigureOut">
               <a:rPr lang="en-US" smtClean="0"/>
-              <a:t>6/23/2014</a:t>
+              <a:t>4/15/2015</a:t>
             </a:fld>
             <a:endParaRPr lang="en-US"/>
           </a:p>
@@ -809,7 +825,7 @@
           <a:p>
             <a:fld id="{A3FFFC81-E8A9-43A5-BD7A-0818E158DC6F}" type="datetimeFigureOut">
               <a:rPr lang="en-US" smtClean="0"/>
-              <a:t>6/23/2014</a:t>
+              <a:t>4/15/2015</a:t>
             </a:fld>
             <a:endParaRPr lang="en-US"/>
           </a:p>
@@ -1055,7 +1071,7 @@
           <a:p>
             <a:fld id="{A3FFFC81-E8A9-43A5-BD7A-0818E158DC6F}" type="datetimeFigureOut">
               <a:rPr lang="en-US" smtClean="0"/>
-              <a:t>6/23/2014</a:t>
+              <a:t>4/15/2015</a:t>
             </a:fld>
             <a:endParaRPr lang="en-US"/>
           </a:p>
@@ -1343,7 +1359,7 @@
           <a:p>
             <a:fld id="{A3FFFC81-E8A9-43A5-BD7A-0818E158DC6F}" type="datetimeFigureOut">
               <a:rPr lang="en-US" smtClean="0"/>
-              <a:t>6/23/2014</a:t>
+              <a:t>4/15/2015</a:t>
             </a:fld>
             <a:endParaRPr lang="en-US"/>
           </a:p>
@@ -1765,7 +1781,7 @@
           <a:p>
             <a:fld id="{A3FFFC81-E8A9-43A5-BD7A-0818E158DC6F}" type="datetimeFigureOut">
               <a:rPr lang="en-US" smtClean="0"/>
-              <a:t>6/23/2014</a:t>
+              <a:t>4/15/2015</a:t>
             </a:fld>
             <a:endParaRPr lang="en-US"/>
           </a:p>
@@ -1883,7 +1899,7 @@
           <a:p>
             <a:fld id="{A3FFFC81-E8A9-43A5-BD7A-0818E158DC6F}" type="datetimeFigureOut">
               <a:rPr lang="en-US" smtClean="0"/>
-              <a:t>6/23/2014</a:t>
+              <a:t>4/15/2015</a:t>
             </a:fld>
             <a:endParaRPr lang="en-US"/>
           </a:p>
@@ -1978,7 +1994,7 @@
           <a:p>
             <a:fld id="{A3FFFC81-E8A9-43A5-BD7A-0818E158DC6F}" type="datetimeFigureOut">
               <a:rPr lang="en-US" smtClean="0"/>
-              <a:t>6/23/2014</a:t>
+              <a:t>4/15/2015</a:t>
             </a:fld>
             <a:endParaRPr lang="en-US"/>
           </a:p>
@@ -2255,7 +2271,7 @@
           <a:p>
             <a:fld id="{A3FFFC81-E8A9-43A5-BD7A-0818E158DC6F}" type="datetimeFigureOut">
               <a:rPr lang="en-US" smtClean="0"/>
-              <a:t>6/23/2014</a:t>
+              <a:t>4/15/2015</a:t>
             </a:fld>
             <a:endParaRPr lang="en-US"/>
           </a:p>
@@ -2508,7 +2524,7 @@
           <a:p>
             <a:fld id="{A3FFFC81-E8A9-43A5-BD7A-0818E158DC6F}" type="datetimeFigureOut">
               <a:rPr lang="en-US" smtClean="0"/>
-              <a:t>6/23/2014</a:t>
+              <a:t>4/15/2015</a:t>
             </a:fld>
             <a:endParaRPr lang="en-US"/>
           </a:p>
@@ -2721,7 +2737,7 @@
           <a:p>
             <a:fld id="{A3FFFC81-E8A9-43A5-BD7A-0818E158DC6F}" type="datetimeFigureOut">
               <a:rPr lang="en-US" smtClean="0"/>
-              <a:t>6/23/2014</a:t>
+              <a:t>4/15/2015</a:t>
             </a:fld>
             <a:endParaRPr lang="en-US"/>
           </a:p>
@@ -3312,166 +3328,6 @@
       </p:sp>
       <p:grpSp>
         <p:nvGrpSpPr>
-          <p:cNvPr id="26" name="Gruppo 25"/>
-          <p:cNvGrpSpPr/>
-          <p:nvPr/>
-        </p:nvGrpSpPr>
-        <p:grpSpPr>
-          <a:xfrm>
-            <a:off x="6156176" y="332656"/>
-            <a:ext cx="1260000" cy="1260000"/>
-            <a:chOff x="6156176" y="332656"/>
-            <a:chExt cx="1260000" cy="1260000"/>
-          </a:xfrm>
-        </p:grpSpPr>
-        <p:sp>
-          <p:nvSpPr>
-            <p:cNvPr id="8" name="Rettangolo 7"/>
-            <p:cNvSpPr/>
-            <p:nvPr/>
-          </p:nvSpPr>
-          <p:spPr>
-            <a:xfrm>
-              <a:off x="6156176" y="332656"/>
-              <a:ext cx="1260000" cy="1260000"/>
-            </a:xfrm>
-            <a:prstGeom prst="rect">
-              <a:avLst/>
-            </a:prstGeom>
-            <a:noFill/>
-            <a:ln w="3175"/>
-          </p:spPr>
-          <p:style>
-            <a:lnRef idx="2">
-              <a:schemeClr val="accent1">
-                <a:shade val="50000"/>
-              </a:schemeClr>
-            </a:lnRef>
-            <a:fillRef idx="1">
-              <a:schemeClr val="accent1"/>
-            </a:fillRef>
-            <a:effectRef idx="0">
-              <a:schemeClr val="accent1"/>
-            </a:effectRef>
-            <a:fontRef idx="minor">
-              <a:schemeClr val="lt1"/>
-            </a:fontRef>
-          </p:style>
-          <p:txBody>
-            <a:bodyPr rtlCol="0" anchor="ctr"/>
-            <a:lstStyle/>
-            <a:p>
-              <a:pPr algn="ctr"/>
-              <a:endParaRPr lang="en-US">
-                <a:noFill/>
-              </a:endParaRPr>
-            </a:p>
-          </p:txBody>
-        </p:sp>
-        <p:sp>
-          <p:nvSpPr>
-            <p:cNvPr id="10" name="Ovale 9"/>
-            <p:cNvSpPr/>
-            <p:nvPr/>
-          </p:nvSpPr>
-          <p:spPr>
-            <a:xfrm>
-              <a:off x="6246176" y="422656"/>
-              <a:ext cx="1080000" cy="1080000"/>
-            </a:xfrm>
-            <a:prstGeom prst="ellipse">
-              <a:avLst/>
-            </a:prstGeom>
-            <a:solidFill>
-              <a:schemeClr val="accent1"/>
-            </a:solidFill>
-            <a:ln>
-              <a:noFill/>
-            </a:ln>
-            <a:effectLst/>
-            <a:scene3d>
-              <a:camera prst="isometricLeftDown">
-                <a:rot lat="0" lon="0" rev="0"/>
-              </a:camera>
-              <a:lightRig rig="soft" dir="t"/>
-            </a:scene3d>
-            <a:sp3d prstMaterial="plastic">
-              <a:bevelT w="508000" h="508000"/>
-              <a:bevelB w="508000" h="508000" prst="coolSlant"/>
-              <a:contourClr>
-                <a:schemeClr val="bg1"/>
-              </a:contourClr>
-            </a:sp3d>
-          </p:spPr>
-          <p:style>
-            <a:lnRef idx="2">
-              <a:schemeClr val="accent1">
-                <a:shade val="50000"/>
-              </a:schemeClr>
-            </a:lnRef>
-            <a:fillRef idx="1">
-              <a:schemeClr val="accent1"/>
-            </a:fillRef>
-            <a:effectRef idx="0">
-              <a:schemeClr val="accent1"/>
-            </a:effectRef>
-            <a:fontRef idx="minor">
-              <a:schemeClr val="lt1"/>
-            </a:fontRef>
-          </p:style>
-          <p:txBody>
-            <a:bodyPr rtlCol="0" anchor="ctr"/>
-            <a:lstStyle/>
-            <a:p>
-              <a:pPr algn="ctr"/>
-              <a:endParaRPr lang="en-US"/>
-            </a:p>
-          </p:txBody>
-        </p:sp>
-        <p:pic>
-          <p:nvPicPr>
-            <p:cNvPr id="1026" name="Picture 2" descr="C:\Users\Administrator\Downloads\add.png"/>
-            <p:cNvPicPr>
-              <a:picLocks noChangeAspect="1" noChangeArrowheads="1"/>
-            </p:cNvPicPr>
-            <p:nvPr/>
-          </p:nvPicPr>
-          <p:blipFill>
-            <a:blip r:embed="rId2" cstate="print">
-              <a:extLst>
-                <a:ext uri="{28A0092B-C50C-407E-A947-70E740481C1C}">
-                  <a14:useLocalDpi xmlns:a14="http://schemas.microsoft.com/office/drawing/2010/main" val="0"/>
-                </a:ext>
-              </a:extLst>
-            </a:blip>
-            <a:srcRect/>
-            <a:stretch>
-              <a:fillRect/>
-            </a:stretch>
-          </p:blipFill>
-          <p:spPr bwMode="auto">
-            <a:xfrm>
-              <a:off x="6697584" y="883920"/>
-              <a:ext cx="695732" cy="695732"/>
-            </a:xfrm>
-            <a:prstGeom prst="rect">
-              <a:avLst/>
-            </a:prstGeom>
-            <a:noFill/>
-            <a:extLst>
-              <a:ext uri="{909E8E84-426E-40DD-AFC4-6F175D3DCCD1}">
-                <a14:hiddenFill xmlns:a14="http://schemas.microsoft.com/office/drawing/2010/main">
-                  <a:solidFill>
-                    <a:srgbClr val="FFFFFF"/>
-                  </a:solidFill>
-                </a14:hiddenFill>
-              </a:ext>
-            </a:extLst>
-          </p:spPr>
-        </p:pic>
-      </p:grpSp>
-      <p:grpSp>
-        <p:nvGrpSpPr>
           <p:cNvPr id="27" name="Gruppo 26"/>
           <p:cNvGrpSpPr/>
           <p:nvPr/>
@@ -3597,7 +3453,7 @@
             <p:nvPr/>
           </p:nvPicPr>
           <p:blipFill>
-            <a:blip r:embed="rId3" cstate="print">
+            <a:blip r:embed="rId2" cstate="print">
               <a:extLst>
                 <a:ext uri="{28A0092B-C50C-407E-A947-70E740481C1C}">
                   <a14:useLocalDpi xmlns:a14="http://schemas.microsoft.com/office/drawing/2010/main" val="0"/>
@@ -3775,7 +3631,7 @@
             <p:nvPr/>
           </p:nvPicPr>
           <p:blipFill>
-            <a:blip r:embed="rId4" cstate="print">
+            <a:blip r:embed="rId3" cstate="print">
               <a:extLst>
                 <a:ext uri="{28A0092B-C50C-407E-A947-70E740481C1C}">
                   <a14:useLocalDpi xmlns:a14="http://schemas.microsoft.com/office/drawing/2010/main" val="0"/>
@@ -3805,7 +3661,7 @@
             <p:nvPr/>
           </p:nvPicPr>
           <p:blipFill>
-            <a:blip r:embed="rId4" cstate="print">
+            <a:blip r:embed="rId3" cstate="print">
               <a:extLst>
                 <a:ext uri="{28A0092B-C50C-407E-A947-70E740481C1C}">
                   <a14:useLocalDpi xmlns:a14="http://schemas.microsoft.com/office/drawing/2010/main" val="0"/>
@@ -3835,7 +3691,7 @@
             <p:nvPr/>
           </p:nvPicPr>
           <p:blipFill>
-            <a:blip r:embed="rId4" cstate="print">
+            <a:blip r:embed="rId3" cstate="print">
               <a:extLst>
                 <a:ext uri="{28A0092B-C50C-407E-A947-70E740481C1C}">
                   <a14:useLocalDpi xmlns:a14="http://schemas.microsoft.com/office/drawing/2010/main" val="0"/>
@@ -3865,7 +3721,7 @@
             <p:nvPr/>
           </p:nvPicPr>
           <p:blipFill>
-            <a:blip r:embed="rId3" cstate="print">
+            <a:blip r:embed="rId2" cstate="print">
               <a:extLst>
                 <a:ext uri="{28A0092B-C50C-407E-A947-70E740481C1C}">
                   <a14:useLocalDpi xmlns:a14="http://schemas.microsoft.com/office/drawing/2010/main" val="0"/>
@@ -3967,7 +3823,7 @@
           <p:nvPr/>
         </p:nvPicPr>
         <p:blipFill>
-          <a:blip r:embed="rId5" cstate="print">
+          <a:blip r:embed="rId4" cstate="print">
             <a:extLst>
               <a:ext uri="{28A0092B-C50C-407E-A947-70E740481C1C}">
                 <a14:useLocalDpi xmlns:a14="http://schemas.microsoft.com/office/drawing/2010/main" val="0"/>
@@ -4544,7 +4400,7 @@
             <p:nvPr/>
           </p:nvPicPr>
           <p:blipFill>
-            <a:blip r:embed="rId5" cstate="print">
+            <a:blip r:embed="rId4" cstate="print">
               <a:extLst>
                 <a:ext uri="{28A0092B-C50C-407E-A947-70E740481C1C}">
                   <a14:useLocalDpi xmlns:a14="http://schemas.microsoft.com/office/drawing/2010/main" val="0"/>
@@ -4574,7 +4430,7 @@
             <p:nvPr/>
           </p:nvPicPr>
           <p:blipFill>
-            <a:blip r:embed="rId5" cstate="print">
+            <a:blip r:embed="rId4" cstate="print">
               <a:extLst>
                 <a:ext uri="{28A0092B-C50C-407E-A947-70E740481C1C}">
                   <a14:useLocalDpi xmlns:a14="http://schemas.microsoft.com/office/drawing/2010/main" val="0"/>
@@ -4604,7 +4460,7 @@
             <p:nvPr/>
           </p:nvPicPr>
           <p:blipFill>
-            <a:blip r:embed="rId5" cstate="print">
+            <a:blip r:embed="rId4" cstate="print">
               <a:extLst>
                 <a:ext uri="{28A0092B-C50C-407E-A947-70E740481C1C}">
                   <a14:useLocalDpi xmlns:a14="http://schemas.microsoft.com/office/drawing/2010/main" val="0"/>
@@ -4634,7 +4490,7 @@
             <p:nvPr/>
           </p:nvPicPr>
           <p:blipFill>
-            <a:blip r:embed="rId5" cstate="print">
+            <a:blip r:embed="rId4" cstate="print">
               <a:extLst>
                 <a:ext uri="{28A0092B-C50C-407E-A947-70E740481C1C}">
                   <a14:useLocalDpi xmlns:a14="http://schemas.microsoft.com/office/drawing/2010/main" val="0"/>
@@ -4664,7 +4520,7 @@
             <p:nvPr/>
           </p:nvPicPr>
           <p:blipFill>
-            <a:blip r:embed="rId5" cstate="print">
+            <a:blip r:embed="rId4" cstate="print">
               <a:extLst>
                 <a:ext uri="{28A0092B-C50C-407E-A947-70E740481C1C}">
                   <a14:useLocalDpi xmlns:a14="http://schemas.microsoft.com/office/drawing/2010/main" val="0"/>
@@ -4694,7 +4550,7 @@
             <p:nvPr/>
           </p:nvPicPr>
           <p:blipFill>
-            <a:blip r:embed="rId5" cstate="print">
+            <a:blip r:embed="rId4" cstate="print">
               <a:extLst>
                 <a:ext uri="{28A0092B-C50C-407E-A947-70E740481C1C}">
                   <a14:useLocalDpi xmlns:a14="http://schemas.microsoft.com/office/drawing/2010/main" val="0"/>
@@ -4724,7 +4580,7 @@
             <p:nvPr/>
           </p:nvPicPr>
           <p:blipFill>
-            <a:blip r:embed="rId6" cstate="print">
+            <a:blip r:embed="rId5" cstate="print">
               <a:extLst>
                 <a:ext uri="{28A0092B-C50C-407E-A947-70E740481C1C}">
                   <a14:useLocalDpi xmlns:a14="http://schemas.microsoft.com/office/drawing/2010/main" val="0"/>
@@ -4765,7 +4621,7 @@
             <p:nvPr/>
           </p:nvPicPr>
           <p:blipFill>
-            <a:blip r:embed="rId5" cstate="print">
+            <a:blip r:embed="rId4" cstate="print">
               <a:extLst>
                 <a:ext uri="{28A0092B-C50C-407E-A947-70E740481C1C}">
                   <a14:useLocalDpi xmlns:a14="http://schemas.microsoft.com/office/drawing/2010/main" val="0"/>
@@ -4795,7 +4651,7 @@
             <p:nvPr/>
           </p:nvPicPr>
           <p:blipFill>
-            <a:blip r:embed="rId5" cstate="print">
+            <a:blip r:embed="rId4" cstate="print">
               <a:extLst>
                 <a:ext uri="{28A0092B-C50C-407E-A947-70E740481C1C}">
                   <a14:useLocalDpi xmlns:a14="http://schemas.microsoft.com/office/drawing/2010/main" val="0"/>
@@ -4825,7 +4681,7 @@
             <p:nvPr/>
           </p:nvPicPr>
           <p:blipFill>
-            <a:blip r:embed="rId5" cstate="print">
+            <a:blip r:embed="rId4" cstate="print">
               <a:extLst>
                 <a:ext uri="{28A0092B-C50C-407E-A947-70E740481C1C}">
                   <a14:useLocalDpi xmlns:a14="http://schemas.microsoft.com/office/drawing/2010/main" val="0"/>
@@ -4855,7 +4711,7 @@
             <p:nvPr/>
           </p:nvPicPr>
           <p:blipFill>
-            <a:blip r:embed="rId5" cstate="print">
+            <a:blip r:embed="rId4" cstate="print">
               <a:extLst>
                 <a:ext uri="{28A0092B-C50C-407E-A947-70E740481C1C}">
                   <a14:useLocalDpi xmlns:a14="http://schemas.microsoft.com/office/drawing/2010/main" val="0"/>
@@ -4925,75 +4781,87 @@
           </a:p>
         </p:txBody>
       </p:sp>
-    </p:spTree>
-    <p:extLst>
-      <p:ext uri="{BB962C8B-B14F-4D97-AF65-F5344CB8AC3E}">
-        <p14:creationId xmlns:p14="http://schemas.microsoft.com/office/powerpoint/2010/main" val="2583342014"/>
-      </p:ext>
-    </p:extLst>
-  </p:cSld>
-  <p:clrMapOvr>
-    <a:masterClrMapping/>
-  </p:clrMapOvr>
-</p:sld>
-</file>
-
-<file path=ppt/slides/slide2.xml><?xml version="1.0" encoding="utf-8"?>
-<p:sld xmlns:a="http://schemas.openxmlformats.org/drawingml/2006/main" xmlns:r="http://schemas.openxmlformats.org/officeDocument/2006/relationships" xmlns:p="http://schemas.openxmlformats.org/presentationml/2006/main">
-  <p:cSld>
-    <p:spTree>
-      <p:nvGrpSpPr>
-        <p:cNvPr id="1" name=""/>
-        <p:cNvGrpSpPr/>
-        <p:nvPr/>
-      </p:nvGrpSpPr>
-      <p:grpSpPr>
-        <a:xfrm>
-          <a:off x="0" y="0"/>
-          <a:ext cx="0" cy="0"/>
-          <a:chOff x="0" y="0"/>
-          <a:chExt cx="0" cy="0"/>
-        </a:xfrm>
-      </p:grpSpPr>
       <p:grpSp>
         <p:nvGrpSpPr>
-          <p:cNvPr id="3" name="Gruppo 2"/>
+          <p:cNvPr id="5" name="Gruppo 4"/>
           <p:cNvGrpSpPr/>
           <p:nvPr/>
         </p:nvGrpSpPr>
         <p:grpSpPr>
           <a:xfrm>
-            <a:off x="1371600" y="1357257"/>
-            <a:ext cx="457200" cy="558339"/>
-            <a:chOff x="4038600" y="2014482"/>
-            <a:chExt cx="457200" cy="558339"/>
+            <a:off x="6156176" y="332656"/>
+            <a:ext cx="1260000" cy="1260000"/>
+            <a:chOff x="6156176" y="332656"/>
+            <a:chExt cx="1260000" cy="1260000"/>
           </a:xfrm>
         </p:grpSpPr>
         <p:grpSp>
           <p:nvGrpSpPr>
-            <p:cNvPr id="9" name="Gruppo 8"/>
-            <p:cNvGrpSpPr>
-              <a:grpSpLocks noChangeAspect="1"/>
-            </p:cNvGrpSpPr>
+            <p:cNvPr id="26" name="Gruppo 25"/>
+            <p:cNvGrpSpPr/>
             <p:nvPr/>
           </p:nvGrpSpPr>
           <p:grpSpPr>
             <a:xfrm>
-              <a:off x="4129088" y="2212564"/>
-              <a:ext cx="357187" cy="360257"/>
-              <a:chOff x="4550726" y="2373219"/>
-              <a:chExt cx="1147140" cy="1156996"/>
+              <a:off x="6156176" y="332656"/>
+              <a:ext cx="1260000" cy="1260000"/>
+              <a:chOff x="6156176" y="332656"/>
+              <a:chExt cx="1260000" cy="1260000"/>
             </a:xfrm>
           </p:grpSpPr>
           <p:sp>
             <p:nvSpPr>
-              <p:cNvPr id="7" name="Ovale 6"/>
+              <p:cNvPr id="8" name="Rettangolo 7"/>
               <p:cNvSpPr/>
               <p:nvPr/>
             </p:nvSpPr>
             <p:spPr>
               <a:xfrm>
-                <a:off x="4550726" y="2373219"/>
+                <a:off x="6156176" y="332656"/>
+                <a:ext cx="1260000" cy="1260000"/>
+              </a:xfrm>
+              <a:prstGeom prst="rect">
+                <a:avLst/>
+              </a:prstGeom>
+              <a:noFill/>
+              <a:ln w="3175"/>
+            </p:spPr>
+            <p:style>
+              <a:lnRef idx="2">
+                <a:schemeClr val="accent1">
+                  <a:shade val="50000"/>
+                </a:schemeClr>
+              </a:lnRef>
+              <a:fillRef idx="1">
+                <a:schemeClr val="accent1"/>
+              </a:fillRef>
+              <a:effectRef idx="0">
+                <a:schemeClr val="accent1"/>
+              </a:effectRef>
+              <a:fontRef idx="minor">
+                <a:schemeClr val="lt1"/>
+              </a:fontRef>
+            </p:style>
+            <p:txBody>
+              <a:bodyPr rtlCol="0" anchor="ctr"/>
+              <a:lstStyle/>
+              <a:p>
+                <a:pPr algn="ctr"/>
+                <a:endParaRPr lang="en-US">
+                  <a:noFill/>
+                </a:endParaRPr>
+              </a:p>
+            </p:txBody>
+          </p:sp>
+          <p:sp>
+            <p:nvSpPr>
+              <p:cNvPr id="10" name="Ovale 9"/>
+              <p:cNvSpPr/>
+              <p:nvPr/>
+            </p:nvSpPr>
+            <p:spPr>
+              <a:xfrm>
+                <a:off x="6246176" y="422656"/>
                 <a:ext cx="1080000" cy="1080000"/>
               </a:xfrm>
               <a:prstGeom prst="ellipse">
@@ -5047,14 +4915,14 @@
           </p:sp>
           <p:pic>
             <p:nvPicPr>
-              <p:cNvPr id="8" name="Picture 2" descr="C:\Users\Administrator\Downloads\add.png"/>
+              <p:cNvPr id="1026" name="Picture 2" descr="C:\Users\Administrator\Downloads\add.png"/>
               <p:cNvPicPr>
                 <a:picLocks noChangeAspect="1" noChangeArrowheads="1"/>
               </p:cNvPicPr>
               <p:nvPr/>
             </p:nvPicPr>
             <p:blipFill>
-              <a:blip r:embed="rId2" cstate="print">
+              <a:blip r:embed="rId6" cstate="print">
                 <a:extLst>
                   <a:ext uri="{28A0092B-C50C-407E-A947-70E740481C1C}">
                     <a14:useLocalDpi xmlns:a14="http://schemas.microsoft.com/office/drawing/2010/main" val="0"/>
@@ -5068,7 +4936,7 @@
             </p:blipFill>
             <p:spPr bwMode="auto">
               <a:xfrm>
-                <a:off x="5002134" y="2834483"/>
+                <a:off x="6697584" y="883920"/>
                 <a:ext cx="695732" cy="695732"/>
               </a:xfrm>
               <a:prstGeom prst="rect">
@@ -5089,14 +4957,14 @@
         </p:grpSp>
         <p:pic>
           <p:nvPicPr>
-            <p:cNvPr id="1026" name="Picture 2" descr="C:\Users\Administrator\Downloads\o_7036c989068210a0-0.png"/>
+            <p:cNvPr id="56" name="Picture 2" descr="C:\Users\Administrator\Downloads\add.png"/>
             <p:cNvPicPr>
               <a:picLocks noChangeAspect="1" noChangeArrowheads="1"/>
             </p:cNvPicPr>
             <p:nvPr/>
           </p:nvPicPr>
           <p:blipFill>
-            <a:blip r:embed="rId3">
+            <a:blip r:embed="rId6" cstate="print">
               <a:extLst>
                 <a:ext uri="{28A0092B-C50C-407E-A947-70E740481C1C}">
                   <a14:useLocalDpi xmlns:a14="http://schemas.microsoft.com/office/drawing/2010/main" val="0"/>
@@ -5110,8 +4978,8 @@
           </p:blipFill>
           <p:spPr bwMode="auto">
             <a:xfrm>
-              <a:off x="4038600" y="2014482"/>
-              <a:ext cx="457200" cy="457200"/>
+              <a:off x="6370241" y="784320"/>
+              <a:ext cx="695732" cy="695732"/>
             </a:xfrm>
             <a:prstGeom prst="rect">
               <a:avLst/>
@@ -5129,6 +4997,36 @@
           </p:spPr>
         </p:pic>
       </p:grpSp>
+    </p:spTree>
+    <p:extLst>
+      <p:ext uri="{BB962C8B-B14F-4D97-AF65-F5344CB8AC3E}">
+        <p14:creationId xmlns:p14="http://schemas.microsoft.com/office/powerpoint/2010/main" val="2583342014"/>
+      </p:ext>
+    </p:extLst>
+  </p:cSld>
+  <p:clrMapOvr>
+    <a:masterClrMapping/>
+  </p:clrMapOvr>
+</p:sld>
+</file>
+
+<file path=ppt/slides/slide2.xml><?xml version="1.0" encoding="utf-8"?>
+<p:sld xmlns:a="http://schemas.openxmlformats.org/drawingml/2006/main" xmlns:r="http://schemas.openxmlformats.org/officeDocument/2006/relationships" xmlns:p="http://schemas.openxmlformats.org/presentationml/2006/main">
+  <p:cSld>
+    <p:spTree>
+      <p:nvGrpSpPr>
+        <p:cNvPr id="1" name=""/>
+        <p:cNvGrpSpPr/>
+        <p:nvPr/>
+      </p:nvGrpSpPr>
+      <p:grpSpPr>
+        <a:xfrm>
+          <a:off x="0" y="0"/>
+          <a:ext cx="0" cy="0"/>
+          <a:chOff x="0" y="0"/>
+          <a:chExt cx="0" cy="0"/>
+        </a:xfrm>
+      </p:grpSpPr>
       <p:grpSp>
         <p:nvGrpSpPr>
           <p:cNvPr id="5" name="Gruppo 4"/>
@@ -5228,7 +5126,7 @@
               <p:nvPr/>
             </p:nvPicPr>
             <p:blipFill>
-              <a:blip r:embed="rId4" cstate="print">
+              <a:blip r:embed="rId2" cstate="print">
                 <a:extLst>
                   <a:ext uri="{28A0092B-C50C-407E-A947-70E740481C1C}">
                     <a14:useLocalDpi xmlns:a14="http://schemas.microsoft.com/office/drawing/2010/main" val="0"/>
@@ -5374,7 +5272,7 @@
             <p:nvPr/>
           </p:nvPicPr>
           <p:blipFill>
-            <a:blip r:embed="rId5" cstate="print">
+            <a:blip r:embed="rId4" cstate="print">
               <a:extLst>
                 <a:ext uri="{28A0092B-C50C-407E-A947-70E740481C1C}">
                   <a14:useLocalDpi xmlns:a14="http://schemas.microsoft.com/office/drawing/2010/main" val="0"/>
@@ -5404,7 +5302,7 @@
             <p:nvPr/>
           </p:nvPicPr>
           <p:blipFill>
-            <a:blip r:embed="rId5" cstate="print">
+            <a:blip r:embed="rId4" cstate="print">
               <a:extLst>
                 <a:ext uri="{28A0092B-C50C-407E-A947-70E740481C1C}">
                   <a14:useLocalDpi xmlns:a14="http://schemas.microsoft.com/office/drawing/2010/main" val="0"/>
@@ -5434,7 +5332,7 @@
             <p:nvPr/>
           </p:nvPicPr>
           <p:blipFill>
-            <a:blip r:embed="rId5" cstate="print">
+            <a:blip r:embed="rId4" cstate="print">
               <a:extLst>
                 <a:ext uri="{28A0092B-C50C-407E-A947-70E740481C1C}">
                   <a14:useLocalDpi xmlns:a14="http://schemas.microsoft.com/office/drawing/2010/main" val="0"/>
@@ -5464,7 +5362,7 @@
             <p:nvPr/>
           </p:nvPicPr>
           <p:blipFill>
-            <a:blip r:embed="rId6" cstate="print">
+            <a:blip r:embed="rId5" cstate="print">
               <a:extLst>
                 <a:ext uri="{28A0092B-C50C-407E-A947-70E740481C1C}">
                   <a14:useLocalDpi xmlns:a14="http://schemas.microsoft.com/office/drawing/2010/main" val="0"/>
@@ -5563,7 +5461,7 @@
             <p:nvPr/>
           </p:nvPicPr>
           <p:blipFill>
-            <a:blip r:embed="rId7">
+            <a:blip r:embed="rId6">
               <a:extLst>
                 <a:ext uri="{28A0092B-C50C-407E-A947-70E740481C1C}">
                   <a14:useLocalDpi xmlns:a14="http://schemas.microsoft.com/office/drawing/2010/main" val="0"/>
@@ -5798,11 +5696,11 @@
           <p:nvPr/>
         </p:nvPicPr>
         <p:blipFill>
-          <a:blip r:embed="rId8">
+          <a:blip r:embed="rId7">
             <a:extLst>
               <a:ext uri="{BEBA8EAE-BF5A-486C-A8C5-ECC9F3942E4B}">
                 <a14:imgProps xmlns:a14="http://schemas.microsoft.com/office/drawing/2010/main">
-                  <a14:imgLayer r:embed="rId9">
+                  <a14:imgLayer r:embed="rId8">
                     <a14:imgEffect>
                       <a14:colorTemperature colorTemp="4700"/>
                     </a14:imgEffect>
@@ -5848,11 +5746,11 @@
           <p:nvPr/>
         </p:nvPicPr>
         <p:blipFill>
-          <a:blip r:embed="rId10">
+          <a:blip r:embed="rId9">
             <a:extLst>
               <a:ext uri="{BEBA8EAE-BF5A-486C-A8C5-ECC9F3942E4B}">
                 <a14:imgProps xmlns:a14="http://schemas.microsoft.com/office/drawing/2010/main">
-                  <a14:imgLayer r:embed="rId11">
+                  <a14:imgLayer r:embed="rId10">
                     <a14:imgEffect>
                       <a14:colorTemperature colorTemp="4700"/>
                     </a14:imgEffect>
@@ -5976,11 +5874,11 @@
           <p:nvPr/>
         </p:nvPicPr>
         <p:blipFill>
-          <a:blip r:embed="rId12">
+          <a:blip r:embed="rId11">
             <a:extLst>
               <a:ext uri="{BEBA8EAE-BF5A-486C-A8C5-ECC9F3942E4B}">
                 <a14:imgProps xmlns:a14="http://schemas.microsoft.com/office/drawing/2010/main">
-                  <a14:imgLayer r:embed="rId13">
+                  <a14:imgLayer r:embed="rId12">
                     <a14:imgEffect>
                       <a14:backgroundRemoval t="4000" b="97778" l="2667" r="95111"/>
                     </a14:imgEffect>
@@ -6026,7 +5924,7 @@
           <p:nvPr/>
         </p:nvPicPr>
         <p:blipFill>
-          <a:blip r:embed="rId14">
+          <a:blip r:embed="rId13">
             <a:extLst>
               <a:ext uri="{28A0092B-C50C-407E-A947-70E740481C1C}">
                 <a14:useLocalDpi xmlns:a14="http://schemas.microsoft.com/office/drawing/2010/main" val="0"/>
@@ -6125,7 +6023,7 @@
             <p:nvPr/>
           </p:nvPicPr>
           <p:blipFill>
-            <a:blip r:embed="rId15">
+            <a:blip r:embed="rId14">
               <a:extLst>
                 <a:ext uri="{28A0092B-C50C-407E-A947-70E740481C1C}">
                   <a14:useLocalDpi xmlns:a14="http://schemas.microsoft.com/office/drawing/2010/main" val="0"/>
@@ -6141,6 +6039,221 @@
             <a:xfrm>
               <a:off x="6222693" y="400464"/>
               <a:ext cx="1116000" cy="1116000"/>
+            </a:xfrm>
+            <a:prstGeom prst="rect">
+              <a:avLst/>
+            </a:prstGeom>
+            <a:noFill/>
+            <a:extLst>
+              <a:ext uri="{909E8E84-426E-40DD-AFC4-6F175D3DCCD1}">
+                <a14:hiddenFill xmlns:a14="http://schemas.microsoft.com/office/drawing/2010/main">
+                  <a:solidFill>
+                    <a:srgbClr val="FFFFFF"/>
+                  </a:solidFill>
+                </a14:hiddenFill>
+              </a:ext>
+            </a:extLst>
+          </p:spPr>
+        </p:pic>
+      </p:grpSp>
+      <p:grpSp>
+        <p:nvGrpSpPr>
+          <p:cNvPr id="4" name="Gruppo 3"/>
+          <p:cNvGrpSpPr/>
+          <p:nvPr/>
+        </p:nvGrpSpPr>
+        <p:grpSpPr>
+          <a:xfrm>
+            <a:off x="1371600" y="1357257"/>
+            <a:ext cx="457200" cy="558339"/>
+            <a:chOff x="1371600" y="1357257"/>
+            <a:chExt cx="457200" cy="558339"/>
+          </a:xfrm>
+        </p:grpSpPr>
+        <p:grpSp>
+          <p:nvGrpSpPr>
+            <p:cNvPr id="9" name="Gruppo 8"/>
+            <p:cNvGrpSpPr>
+              <a:grpSpLocks noChangeAspect="1"/>
+            </p:cNvGrpSpPr>
+            <p:nvPr/>
+          </p:nvGrpSpPr>
+          <p:grpSpPr>
+            <a:xfrm>
+              <a:off x="1462088" y="1555339"/>
+              <a:ext cx="357187" cy="360257"/>
+              <a:chOff x="4550726" y="2373219"/>
+              <a:chExt cx="1147140" cy="1156996"/>
+            </a:xfrm>
+          </p:grpSpPr>
+          <p:sp>
+            <p:nvSpPr>
+              <p:cNvPr id="7" name="Ovale 6"/>
+              <p:cNvSpPr/>
+              <p:nvPr/>
+            </p:nvSpPr>
+            <p:spPr>
+              <a:xfrm>
+                <a:off x="4550726" y="2373219"/>
+                <a:ext cx="1080000" cy="1080000"/>
+              </a:xfrm>
+              <a:prstGeom prst="ellipse">
+                <a:avLst/>
+              </a:prstGeom>
+              <a:solidFill>
+                <a:schemeClr val="accent1"/>
+              </a:solidFill>
+              <a:ln>
+                <a:noFill/>
+              </a:ln>
+              <a:effectLst/>
+              <a:scene3d>
+                <a:camera prst="isometricLeftDown">
+                  <a:rot lat="0" lon="0" rev="0"/>
+                </a:camera>
+                <a:lightRig rig="soft" dir="t"/>
+              </a:scene3d>
+              <a:sp3d prstMaterial="plastic">
+                <a:bevelT w="508000" h="508000"/>
+                <a:bevelB w="508000" h="508000" prst="coolSlant"/>
+                <a:contourClr>
+                  <a:schemeClr val="bg1"/>
+                </a:contourClr>
+              </a:sp3d>
+            </p:spPr>
+            <p:style>
+              <a:lnRef idx="2">
+                <a:schemeClr val="accent1">
+                  <a:shade val="50000"/>
+                </a:schemeClr>
+              </a:lnRef>
+              <a:fillRef idx="1">
+                <a:schemeClr val="accent1"/>
+              </a:fillRef>
+              <a:effectRef idx="0">
+                <a:schemeClr val="accent1"/>
+              </a:effectRef>
+              <a:fontRef idx="minor">
+                <a:schemeClr val="lt1"/>
+              </a:fontRef>
+            </p:style>
+            <p:txBody>
+              <a:bodyPr rtlCol="0" anchor="ctr"/>
+              <a:lstStyle/>
+              <a:p>
+                <a:pPr algn="ctr"/>
+                <a:endParaRPr lang="en-US"/>
+              </a:p>
+            </p:txBody>
+          </p:sp>
+          <p:pic>
+            <p:nvPicPr>
+              <p:cNvPr id="8" name="Picture 2" descr="C:\Users\Administrator\Downloads\add.png"/>
+              <p:cNvPicPr>
+                <a:picLocks noChangeAspect="1" noChangeArrowheads="1"/>
+              </p:cNvPicPr>
+              <p:nvPr/>
+            </p:nvPicPr>
+            <p:blipFill>
+              <a:blip r:embed="rId15" cstate="print">
+                <a:extLst>
+                  <a:ext uri="{28A0092B-C50C-407E-A947-70E740481C1C}">
+                    <a14:useLocalDpi xmlns:a14="http://schemas.microsoft.com/office/drawing/2010/main" val="0"/>
+                  </a:ext>
+                </a:extLst>
+              </a:blip>
+              <a:srcRect/>
+              <a:stretch>
+                <a:fillRect/>
+              </a:stretch>
+            </p:blipFill>
+            <p:spPr bwMode="auto">
+              <a:xfrm>
+                <a:off x="5002134" y="2834483"/>
+                <a:ext cx="695732" cy="695732"/>
+              </a:xfrm>
+              <a:prstGeom prst="rect">
+                <a:avLst/>
+              </a:prstGeom>
+              <a:noFill/>
+              <a:extLst>
+                <a:ext uri="{909E8E84-426E-40DD-AFC4-6F175D3DCCD1}">
+                  <a14:hiddenFill xmlns:a14="http://schemas.microsoft.com/office/drawing/2010/main">
+                    <a:solidFill>
+                      <a:srgbClr val="FFFFFF"/>
+                    </a:solidFill>
+                  </a14:hiddenFill>
+                </a:ext>
+              </a:extLst>
+            </p:spPr>
+          </p:pic>
+        </p:grpSp>
+        <p:pic>
+          <p:nvPicPr>
+            <p:cNvPr id="35" name="Picture 2" descr="C:\Users\Administrator\Downloads\add.png"/>
+            <p:cNvPicPr>
+              <a:picLocks noChangeAspect="1" noChangeArrowheads="1"/>
+            </p:cNvPicPr>
+            <p:nvPr/>
+          </p:nvPicPr>
+          <p:blipFill>
+            <a:blip r:embed="rId15" cstate="print">
+              <a:extLst>
+                <a:ext uri="{28A0092B-C50C-407E-A947-70E740481C1C}">
+                  <a14:useLocalDpi xmlns:a14="http://schemas.microsoft.com/office/drawing/2010/main" val="0"/>
+                </a:ext>
+              </a:extLst>
+            </a:blip>
+            <a:srcRect/>
+            <a:stretch>
+              <a:fillRect/>
+            </a:stretch>
+          </p:blipFill>
+          <p:spPr bwMode="auto">
+            <a:xfrm>
+              <a:off x="1527008" y="1668828"/>
+              <a:ext cx="216631" cy="216632"/>
+            </a:xfrm>
+            <a:prstGeom prst="rect">
+              <a:avLst/>
+            </a:prstGeom>
+            <a:noFill/>
+            <a:extLst>
+              <a:ext uri="{909E8E84-426E-40DD-AFC4-6F175D3DCCD1}">
+                <a14:hiddenFill xmlns:a14="http://schemas.microsoft.com/office/drawing/2010/main">
+                  <a:solidFill>
+                    <a:srgbClr val="FFFFFF"/>
+                  </a:solidFill>
+                </a14:hiddenFill>
+              </a:ext>
+            </a:extLst>
+          </p:spPr>
+        </p:pic>
+        <p:pic>
+          <p:nvPicPr>
+            <p:cNvPr id="1026" name="Picture 2" descr="C:\Users\Administrator\Downloads\o_7036c989068210a0-0.png"/>
+            <p:cNvPicPr>
+              <a:picLocks noChangeAspect="1" noChangeArrowheads="1"/>
+            </p:cNvPicPr>
+            <p:nvPr/>
+          </p:nvPicPr>
+          <p:blipFill>
+            <a:blip r:embed="rId3">
+              <a:extLst>
+                <a:ext uri="{28A0092B-C50C-407E-A947-70E740481C1C}">
+                  <a14:useLocalDpi xmlns:a14="http://schemas.microsoft.com/office/drawing/2010/main" val="0"/>
+                </a:ext>
+              </a:extLst>
+            </a:blip>
+            <a:srcRect/>
+            <a:stretch>
+              <a:fillRect/>
+            </a:stretch>
+          </p:blipFill>
+          <p:spPr bwMode="auto">
+            <a:xfrm>
+              <a:off x="1371600" y="1357257"/>
+              <a:ext cx="457200" cy="457200"/>
             </a:xfrm>
             <a:prstGeom prst="rect">
               <a:avLst/>

</xml_diff>